<commit_message>
updated slides and docs
</commit_message>
<xml_diff>
--- a/pres-source/01-cloud-overview.pptx
+++ b/pres-source/01-cloud-overview.pptx
@@ -1,6 +1,6 @@
 
 <file path=ppt/presentation.xml><?xml version="1.0" encoding="utf-8"?>
-<p:presentation xmlns:a="http://schemas.openxmlformats.org/drawingml/2006/main" xmlns:r="http://schemas.openxmlformats.org/officeDocument/2006/relationships" xmlns:mc="http://schemas.openxmlformats.org/markup-compatibility/2006" xmlns:mv="urn:schemas-microsoft-com:mac:vml" xmlns:p="http://schemas.openxmlformats.org/presentationml/2006/main" xmlns:c="http://schemas.openxmlformats.org/drawingml/2006/chart" xmlns:dgm="http://schemas.openxmlformats.org/drawingml/2006/diagram" xmlns:o="urn:schemas-microsoft-com:office:office" xmlns:v="urn:schemas-microsoft-com:vml" xmlns:pvml="urn:schemas-microsoft-com:office:powerpoint" xmlns:com="http://schemas.openxmlformats.org/drawingml/2006/compatibility" xmlns:p14="http://schemas.microsoft.com/office/powerpoint/2010/main" xmlns:p15="http://schemas.microsoft.com/office/powerpoint/2012/main" autoCompressPictures="0" embedTrueTypeFonts="1" strictFirstAndLastChars="0" saveSubsetFonts="1">
+<p:presentation xmlns:a="http://schemas.openxmlformats.org/drawingml/2006/main" xmlns:r="http://schemas.openxmlformats.org/officeDocument/2006/relationships" xmlns:mc="http://schemas.openxmlformats.org/markup-compatibility/2006" xmlns:mv="urn:schemas-microsoft-com:mac:vml" xmlns:p="http://schemas.openxmlformats.org/presentationml/2006/main" xmlns:c="http://schemas.openxmlformats.org/drawingml/2006/chart" xmlns:dgm="http://schemas.openxmlformats.org/drawingml/2006/diagram" xmlns:o="urn:schemas-microsoft-com:office:office" xmlns:v="urn:schemas-microsoft-com:vml" xmlns:pvml="urn:schemas-microsoft-com:office:powerpoint" xmlns:com="http://schemas.openxmlformats.org/drawingml/2006/compatibility" xmlns:p14="http://schemas.microsoft.com/office/powerpoint/2010/main" xmlns:p15="http://schemas.microsoft.com/office/powerpoint/2012/main" xmlns:ahyp="http://schemas.microsoft.com/office/drawing/2018/hyperlinkcolor" autoCompressPictures="0" embedTrueTypeFonts="1" strictFirstAndLastChars="0" saveSubsetFonts="1">
   <p:sldMasterIdLst>
     <p:sldMasterId id="2147483660" r:id="rId4"/>
   </p:sldMasterIdLst>
@@ -307,7 +307,7 @@
 </file>
 
 <file path=ppt/notesMasters/notesMaster1.xml><?xml version="1.0" encoding="utf-8"?>
-<p:notesMaster xmlns:a="http://schemas.openxmlformats.org/drawingml/2006/main" xmlns:r="http://schemas.openxmlformats.org/officeDocument/2006/relationships" xmlns:mc="http://schemas.openxmlformats.org/markup-compatibility/2006" xmlns:mv="urn:schemas-microsoft-com:mac:vml" xmlns:p="http://schemas.openxmlformats.org/presentationml/2006/main" xmlns:c="http://schemas.openxmlformats.org/drawingml/2006/chart" xmlns:dgm="http://schemas.openxmlformats.org/drawingml/2006/diagram" xmlns:o="urn:schemas-microsoft-com:office:office" xmlns:v="urn:schemas-microsoft-com:vml" xmlns:pvml="urn:schemas-microsoft-com:office:powerpoint" xmlns:com="http://schemas.openxmlformats.org/drawingml/2006/compatibility" xmlns:p14="http://schemas.microsoft.com/office/powerpoint/2010/main" xmlns:p15="http://schemas.microsoft.com/office/powerpoint/2012/main">
+<p:notesMaster xmlns:a="http://schemas.openxmlformats.org/drawingml/2006/main" xmlns:r="http://schemas.openxmlformats.org/officeDocument/2006/relationships" xmlns:mc="http://schemas.openxmlformats.org/markup-compatibility/2006" xmlns:mv="urn:schemas-microsoft-com:mac:vml" xmlns:p="http://schemas.openxmlformats.org/presentationml/2006/main" xmlns:c="http://schemas.openxmlformats.org/drawingml/2006/chart" xmlns:dgm="http://schemas.openxmlformats.org/drawingml/2006/diagram" xmlns:o="urn:schemas-microsoft-com:office:office" xmlns:v="urn:schemas-microsoft-com:vml" xmlns:pvml="urn:schemas-microsoft-com:office:powerpoint" xmlns:com="http://schemas.openxmlformats.org/drawingml/2006/compatibility" xmlns:p14="http://schemas.microsoft.com/office/powerpoint/2010/main" xmlns:p15="http://schemas.microsoft.com/office/powerpoint/2012/main" xmlns:ahyp="http://schemas.microsoft.com/office/drawing/2018/hyperlinkcolor">
   <p:cSld>
     <p:bg>
       <p:bgPr>
@@ -1475,7 +1475,7 @@
 </file>
 
 <file path=ppt/notesSlides/notesSlide1.xml><?xml version="1.0" encoding="utf-8"?>
-<p:notes xmlns:a="http://schemas.openxmlformats.org/drawingml/2006/main" xmlns:r="http://schemas.openxmlformats.org/officeDocument/2006/relationships" xmlns:mc="http://schemas.openxmlformats.org/markup-compatibility/2006" xmlns:mv="urn:schemas-microsoft-com:mac:vml" xmlns:p="http://schemas.openxmlformats.org/presentationml/2006/main" xmlns:c="http://schemas.openxmlformats.org/drawingml/2006/chart" xmlns:dgm="http://schemas.openxmlformats.org/drawingml/2006/diagram" xmlns:o="urn:schemas-microsoft-com:office:office" xmlns:v="urn:schemas-microsoft-com:vml" xmlns:pvml="urn:schemas-microsoft-com:office:powerpoint" xmlns:com="http://schemas.openxmlformats.org/drawingml/2006/compatibility" xmlns:p14="http://schemas.microsoft.com/office/powerpoint/2010/main" xmlns:p15="http://schemas.microsoft.com/office/powerpoint/2012/main" showMasterPhAnim="0" showMasterSp="0">
+<p:notes xmlns:a="http://schemas.openxmlformats.org/drawingml/2006/main" xmlns:r="http://schemas.openxmlformats.org/officeDocument/2006/relationships" xmlns:mc="http://schemas.openxmlformats.org/markup-compatibility/2006" xmlns:mv="urn:schemas-microsoft-com:mac:vml" xmlns:p="http://schemas.openxmlformats.org/presentationml/2006/main" xmlns:c="http://schemas.openxmlformats.org/drawingml/2006/chart" xmlns:dgm="http://schemas.openxmlformats.org/drawingml/2006/diagram" xmlns:o="urn:schemas-microsoft-com:office:office" xmlns:v="urn:schemas-microsoft-com:vml" xmlns:pvml="urn:schemas-microsoft-com:office:powerpoint" xmlns:com="http://schemas.openxmlformats.org/drawingml/2006/compatibility" xmlns:p14="http://schemas.microsoft.com/office/powerpoint/2010/main" xmlns:p15="http://schemas.microsoft.com/office/powerpoint/2012/main" xmlns:ahyp="http://schemas.microsoft.com/office/drawing/2018/hyperlinkcolor" showMasterPhAnim="0" showMasterSp="0">
   <p:cSld>
     <p:spTree>
       <p:nvGrpSpPr>
@@ -1574,7 +1574,7 @@
 </file>
 
 <file path=ppt/notesSlides/notesSlide10.xml><?xml version="1.0" encoding="utf-8"?>
-<p:notes xmlns:a="http://schemas.openxmlformats.org/drawingml/2006/main" xmlns:r="http://schemas.openxmlformats.org/officeDocument/2006/relationships" xmlns:mc="http://schemas.openxmlformats.org/markup-compatibility/2006" xmlns:mv="urn:schemas-microsoft-com:mac:vml" xmlns:p="http://schemas.openxmlformats.org/presentationml/2006/main" xmlns:c="http://schemas.openxmlformats.org/drawingml/2006/chart" xmlns:dgm="http://schemas.openxmlformats.org/drawingml/2006/diagram" xmlns:o="urn:schemas-microsoft-com:office:office" xmlns:v="urn:schemas-microsoft-com:vml" xmlns:pvml="urn:schemas-microsoft-com:office:powerpoint" xmlns:com="http://schemas.openxmlformats.org/drawingml/2006/compatibility" xmlns:p14="http://schemas.microsoft.com/office/powerpoint/2010/main" xmlns:p15="http://schemas.microsoft.com/office/powerpoint/2012/main" showMasterPhAnim="0" showMasterSp="0">
+<p:notes xmlns:a="http://schemas.openxmlformats.org/drawingml/2006/main" xmlns:r="http://schemas.openxmlformats.org/officeDocument/2006/relationships" xmlns:mc="http://schemas.openxmlformats.org/markup-compatibility/2006" xmlns:mv="urn:schemas-microsoft-com:mac:vml" xmlns:p="http://schemas.openxmlformats.org/presentationml/2006/main" xmlns:c="http://schemas.openxmlformats.org/drawingml/2006/chart" xmlns:dgm="http://schemas.openxmlformats.org/drawingml/2006/diagram" xmlns:o="urn:schemas-microsoft-com:office:office" xmlns:v="urn:schemas-microsoft-com:vml" xmlns:pvml="urn:schemas-microsoft-com:office:powerpoint" xmlns:com="http://schemas.openxmlformats.org/drawingml/2006/compatibility" xmlns:p14="http://schemas.microsoft.com/office/powerpoint/2010/main" xmlns:p15="http://schemas.microsoft.com/office/powerpoint/2012/main" xmlns:ahyp="http://schemas.microsoft.com/office/drawing/2018/hyperlinkcolor" showMasterPhAnim="0" showMasterSp="0">
   <p:cSld>
     <p:spTree>
       <p:nvGrpSpPr>
@@ -1673,7 +1673,7 @@
 </file>
 
 <file path=ppt/notesSlides/notesSlide11.xml><?xml version="1.0" encoding="utf-8"?>
-<p:notes xmlns:a="http://schemas.openxmlformats.org/drawingml/2006/main" xmlns:r="http://schemas.openxmlformats.org/officeDocument/2006/relationships" xmlns:mc="http://schemas.openxmlformats.org/markup-compatibility/2006" xmlns:mv="urn:schemas-microsoft-com:mac:vml" xmlns:p="http://schemas.openxmlformats.org/presentationml/2006/main" xmlns:c="http://schemas.openxmlformats.org/drawingml/2006/chart" xmlns:dgm="http://schemas.openxmlformats.org/drawingml/2006/diagram" xmlns:o="urn:schemas-microsoft-com:office:office" xmlns:v="urn:schemas-microsoft-com:vml" xmlns:pvml="urn:schemas-microsoft-com:office:powerpoint" xmlns:com="http://schemas.openxmlformats.org/drawingml/2006/compatibility" xmlns:p14="http://schemas.microsoft.com/office/powerpoint/2010/main" xmlns:p15="http://schemas.microsoft.com/office/powerpoint/2012/main" showMasterPhAnim="0" showMasterSp="0">
+<p:notes xmlns:a="http://schemas.openxmlformats.org/drawingml/2006/main" xmlns:r="http://schemas.openxmlformats.org/officeDocument/2006/relationships" xmlns:mc="http://schemas.openxmlformats.org/markup-compatibility/2006" xmlns:mv="urn:schemas-microsoft-com:mac:vml" xmlns:p="http://schemas.openxmlformats.org/presentationml/2006/main" xmlns:c="http://schemas.openxmlformats.org/drawingml/2006/chart" xmlns:dgm="http://schemas.openxmlformats.org/drawingml/2006/diagram" xmlns:o="urn:schemas-microsoft-com:office:office" xmlns:v="urn:schemas-microsoft-com:vml" xmlns:pvml="urn:schemas-microsoft-com:office:powerpoint" xmlns:com="http://schemas.openxmlformats.org/drawingml/2006/compatibility" xmlns:p14="http://schemas.microsoft.com/office/powerpoint/2010/main" xmlns:p15="http://schemas.microsoft.com/office/powerpoint/2012/main" xmlns:ahyp="http://schemas.microsoft.com/office/drawing/2018/hyperlinkcolor" showMasterPhAnim="0" showMasterSp="0">
   <p:cSld>
     <p:spTree>
       <p:nvGrpSpPr>
@@ -1772,7 +1772,7 @@
 </file>
 
 <file path=ppt/notesSlides/notesSlide12.xml><?xml version="1.0" encoding="utf-8"?>
-<p:notes xmlns:a="http://schemas.openxmlformats.org/drawingml/2006/main" xmlns:r="http://schemas.openxmlformats.org/officeDocument/2006/relationships" xmlns:mc="http://schemas.openxmlformats.org/markup-compatibility/2006" xmlns:mv="urn:schemas-microsoft-com:mac:vml" xmlns:p="http://schemas.openxmlformats.org/presentationml/2006/main" xmlns:c="http://schemas.openxmlformats.org/drawingml/2006/chart" xmlns:dgm="http://schemas.openxmlformats.org/drawingml/2006/diagram" xmlns:o="urn:schemas-microsoft-com:office:office" xmlns:v="urn:schemas-microsoft-com:vml" xmlns:pvml="urn:schemas-microsoft-com:office:powerpoint" xmlns:com="http://schemas.openxmlformats.org/drawingml/2006/compatibility" xmlns:p14="http://schemas.microsoft.com/office/powerpoint/2010/main" xmlns:p15="http://schemas.microsoft.com/office/powerpoint/2012/main" showMasterPhAnim="0" showMasterSp="0">
+<p:notes xmlns:a="http://schemas.openxmlformats.org/drawingml/2006/main" xmlns:r="http://schemas.openxmlformats.org/officeDocument/2006/relationships" xmlns:mc="http://schemas.openxmlformats.org/markup-compatibility/2006" xmlns:mv="urn:schemas-microsoft-com:mac:vml" xmlns:p="http://schemas.openxmlformats.org/presentationml/2006/main" xmlns:c="http://schemas.openxmlformats.org/drawingml/2006/chart" xmlns:dgm="http://schemas.openxmlformats.org/drawingml/2006/diagram" xmlns:o="urn:schemas-microsoft-com:office:office" xmlns:v="urn:schemas-microsoft-com:vml" xmlns:pvml="urn:schemas-microsoft-com:office:powerpoint" xmlns:com="http://schemas.openxmlformats.org/drawingml/2006/compatibility" xmlns:p14="http://schemas.microsoft.com/office/powerpoint/2010/main" xmlns:p15="http://schemas.microsoft.com/office/powerpoint/2012/main" xmlns:ahyp="http://schemas.microsoft.com/office/drawing/2018/hyperlinkcolor" showMasterPhAnim="0" showMasterSp="0">
   <p:cSld>
     <p:spTree>
       <p:nvGrpSpPr>
@@ -1871,7 +1871,7 @@
 </file>
 
 <file path=ppt/notesSlides/notesSlide13.xml><?xml version="1.0" encoding="utf-8"?>
-<p:notes xmlns:a="http://schemas.openxmlformats.org/drawingml/2006/main" xmlns:r="http://schemas.openxmlformats.org/officeDocument/2006/relationships" xmlns:mc="http://schemas.openxmlformats.org/markup-compatibility/2006" xmlns:mv="urn:schemas-microsoft-com:mac:vml" xmlns:p="http://schemas.openxmlformats.org/presentationml/2006/main" xmlns:c="http://schemas.openxmlformats.org/drawingml/2006/chart" xmlns:dgm="http://schemas.openxmlformats.org/drawingml/2006/diagram" xmlns:o="urn:schemas-microsoft-com:office:office" xmlns:v="urn:schemas-microsoft-com:vml" xmlns:pvml="urn:schemas-microsoft-com:office:powerpoint" xmlns:com="http://schemas.openxmlformats.org/drawingml/2006/compatibility" xmlns:p14="http://schemas.microsoft.com/office/powerpoint/2010/main" xmlns:p15="http://schemas.microsoft.com/office/powerpoint/2012/main" showMasterPhAnim="0" showMasterSp="0">
+<p:notes xmlns:a="http://schemas.openxmlformats.org/drawingml/2006/main" xmlns:r="http://schemas.openxmlformats.org/officeDocument/2006/relationships" xmlns:mc="http://schemas.openxmlformats.org/markup-compatibility/2006" xmlns:mv="urn:schemas-microsoft-com:mac:vml" xmlns:p="http://schemas.openxmlformats.org/presentationml/2006/main" xmlns:c="http://schemas.openxmlformats.org/drawingml/2006/chart" xmlns:dgm="http://schemas.openxmlformats.org/drawingml/2006/diagram" xmlns:o="urn:schemas-microsoft-com:office:office" xmlns:v="urn:schemas-microsoft-com:vml" xmlns:pvml="urn:schemas-microsoft-com:office:powerpoint" xmlns:com="http://schemas.openxmlformats.org/drawingml/2006/compatibility" xmlns:p14="http://schemas.microsoft.com/office/powerpoint/2010/main" xmlns:p15="http://schemas.microsoft.com/office/powerpoint/2012/main" xmlns:ahyp="http://schemas.microsoft.com/office/drawing/2018/hyperlinkcolor" showMasterPhAnim="0" showMasterSp="0">
   <p:cSld>
     <p:spTree>
       <p:nvGrpSpPr>
@@ -1970,7 +1970,7 @@
 </file>
 
 <file path=ppt/notesSlides/notesSlide14.xml><?xml version="1.0" encoding="utf-8"?>
-<p:notes xmlns:a="http://schemas.openxmlformats.org/drawingml/2006/main" xmlns:r="http://schemas.openxmlformats.org/officeDocument/2006/relationships" xmlns:mc="http://schemas.openxmlformats.org/markup-compatibility/2006" xmlns:mv="urn:schemas-microsoft-com:mac:vml" xmlns:p="http://schemas.openxmlformats.org/presentationml/2006/main" xmlns:c="http://schemas.openxmlformats.org/drawingml/2006/chart" xmlns:dgm="http://schemas.openxmlformats.org/drawingml/2006/diagram" xmlns:o="urn:schemas-microsoft-com:office:office" xmlns:v="urn:schemas-microsoft-com:vml" xmlns:pvml="urn:schemas-microsoft-com:office:powerpoint" xmlns:com="http://schemas.openxmlformats.org/drawingml/2006/compatibility" xmlns:p14="http://schemas.microsoft.com/office/powerpoint/2010/main" xmlns:p15="http://schemas.microsoft.com/office/powerpoint/2012/main" showMasterPhAnim="0" showMasterSp="0">
+<p:notes xmlns:a="http://schemas.openxmlformats.org/drawingml/2006/main" xmlns:r="http://schemas.openxmlformats.org/officeDocument/2006/relationships" xmlns:mc="http://schemas.openxmlformats.org/markup-compatibility/2006" xmlns:mv="urn:schemas-microsoft-com:mac:vml" xmlns:p="http://schemas.openxmlformats.org/presentationml/2006/main" xmlns:c="http://schemas.openxmlformats.org/drawingml/2006/chart" xmlns:dgm="http://schemas.openxmlformats.org/drawingml/2006/diagram" xmlns:o="urn:schemas-microsoft-com:office:office" xmlns:v="urn:schemas-microsoft-com:vml" xmlns:pvml="urn:schemas-microsoft-com:office:powerpoint" xmlns:com="http://schemas.openxmlformats.org/drawingml/2006/compatibility" xmlns:p14="http://schemas.microsoft.com/office/powerpoint/2010/main" xmlns:p15="http://schemas.microsoft.com/office/powerpoint/2012/main" xmlns:ahyp="http://schemas.microsoft.com/office/drawing/2018/hyperlinkcolor" showMasterPhAnim="0" showMasterSp="0">
   <p:cSld>
     <p:spTree>
       <p:nvGrpSpPr>
@@ -2069,7 +2069,7 @@
 </file>
 
 <file path=ppt/notesSlides/notesSlide15.xml><?xml version="1.0" encoding="utf-8"?>
-<p:notes xmlns:a="http://schemas.openxmlformats.org/drawingml/2006/main" xmlns:r="http://schemas.openxmlformats.org/officeDocument/2006/relationships" xmlns:mc="http://schemas.openxmlformats.org/markup-compatibility/2006" xmlns:mv="urn:schemas-microsoft-com:mac:vml" xmlns:p="http://schemas.openxmlformats.org/presentationml/2006/main" xmlns:c="http://schemas.openxmlformats.org/drawingml/2006/chart" xmlns:dgm="http://schemas.openxmlformats.org/drawingml/2006/diagram" xmlns:o="urn:schemas-microsoft-com:office:office" xmlns:v="urn:schemas-microsoft-com:vml" xmlns:pvml="urn:schemas-microsoft-com:office:powerpoint" xmlns:com="http://schemas.openxmlformats.org/drawingml/2006/compatibility" xmlns:p14="http://schemas.microsoft.com/office/powerpoint/2010/main" xmlns:p15="http://schemas.microsoft.com/office/powerpoint/2012/main" showMasterPhAnim="0" showMasterSp="0">
+<p:notes xmlns:a="http://schemas.openxmlformats.org/drawingml/2006/main" xmlns:r="http://schemas.openxmlformats.org/officeDocument/2006/relationships" xmlns:mc="http://schemas.openxmlformats.org/markup-compatibility/2006" xmlns:mv="urn:schemas-microsoft-com:mac:vml" xmlns:p="http://schemas.openxmlformats.org/presentationml/2006/main" xmlns:c="http://schemas.openxmlformats.org/drawingml/2006/chart" xmlns:dgm="http://schemas.openxmlformats.org/drawingml/2006/diagram" xmlns:o="urn:schemas-microsoft-com:office:office" xmlns:v="urn:schemas-microsoft-com:vml" xmlns:pvml="urn:schemas-microsoft-com:office:powerpoint" xmlns:com="http://schemas.openxmlformats.org/drawingml/2006/compatibility" xmlns:p14="http://schemas.microsoft.com/office/powerpoint/2010/main" xmlns:p15="http://schemas.microsoft.com/office/powerpoint/2012/main" xmlns:ahyp="http://schemas.microsoft.com/office/drawing/2018/hyperlinkcolor" showMasterPhAnim="0" showMasterSp="0">
   <p:cSld>
     <p:spTree>
       <p:nvGrpSpPr>
@@ -2168,7 +2168,7 @@
 </file>
 
 <file path=ppt/notesSlides/notesSlide16.xml><?xml version="1.0" encoding="utf-8"?>
-<p:notes xmlns:a="http://schemas.openxmlformats.org/drawingml/2006/main" xmlns:r="http://schemas.openxmlformats.org/officeDocument/2006/relationships" xmlns:mc="http://schemas.openxmlformats.org/markup-compatibility/2006" xmlns:mv="urn:schemas-microsoft-com:mac:vml" xmlns:p="http://schemas.openxmlformats.org/presentationml/2006/main" xmlns:c="http://schemas.openxmlformats.org/drawingml/2006/chart" xmlns:dgm="http://schemas.openxmlformats.org/drawingml/2006/diagram" xmlns:o="urn:schemas-microsoft-com:office:office" xmlns:v="urn:schemas-microsoft-com:vml" xmlns:pvml="urn:schemas-microsoft-com:office:powerpoint" xmlns:com="http://schemas.openxmlformats.org/drawingml/2006/compatibility" xmlns:p14="http://schemas.microsoft.com/office/powerpoint/2010/main" xmlns:p15="http://schemas.microsoft.com/office/powerpoint/2012/main" showMasterPhAnim="0" showMasterSp="0">
+<p:notes xmlns:a="http://schemas.openxmlformats.org/drawingml/2006/main" xmlns:r="http://schemas.openxmlformats.org/officeDocument/2006/relationships" xmlns:mc="http://schemas.openxmlformats.org/markup-compatibility/2006" xmlns:mv="urn:schemas-microsoft-com:mac:vml" xmlns:p="http://schemas.openxmlformats.org/presentationml/2006/main" xmlns:c="http://schemas.openxmlformats.org/drawingml/2006/chart" xmlns:dgm="http://schemas.openxmlformats.org/drawingml/2006/diagram" xmlns:o="urn:schemas-microsoft-com:office:office" xmlns:v="urn:schemas-microsoft-com:vml" xmlns:pvml="urn:schemas-microsoft-com:office:powerpoint" xmlns:com="http://schemas.openxmlformats.org/drawingml/2006/compatibility" xmlns:p14="http://schemas.microsoft.com/office/powerpoint/2010/main" xmlns:p15="http://schemas.microsoft.com/office/powerpoint/2012/main" xmlns:ahyp="http://schemas.microsoft.com/office/drawing/2018/hyperlinkcolor" showMasterPhAnim="0" showMasterSp="0">
   <p:cSld>
     <p:spTree>
       <p:nvGrpSpPr>
@@ -2267,7 +2267,7 @@
 </file>
 
 <file path=ppt/notesSlides/notesSlide17.xml><?xml version="1.0" encoding="utf-8"?>
-<p:notes xmlns:a="http://schemas.openxmlformats.org/drawingml/2006/main" xmlns:r="http://schemas.openxmlformats.org/officeDocument/2006/relationships" xmlns:mc="http://schemas.openxmlformats.org/markup-compatibility/2006" xmlns:mv="urn:schemas-microsoft-com:mac:vml" xmlns:p="http://schemas.openxmlformats.org/presentationml/2006/main" xmlns:c="http://schemas.openxmlformats.org/drawingml/2006/chart" xmlns:dgm="http://schemas.openxmlformats.org/drawingml/2006/diagram" xmlns:o="urn:schemas-microsoft-com:office:office" xmlns:v="urn:schemas-microsoft-com:vml" xmlns:pvml="urn:schemas-microsoft-com:office:powerpoint" xmlns:com="http://schemas.openxmlformats.org/drawingml/2006/compatibility" xmlns:p14="http://schemas.microsoft.com/office/powerpoint/2010/main" xmlns:p15="http://schemas.microsoft.com/office/powerpoint/2012/main" showMasterPhAnim="0" showMasterSp="0">
+<p:notes xmlns:a="http://schemas.openxmlformats.org/drawingml/2006/main" xmlns:r="http://schemas.openxmlformats.org/officeDocument/2006/relationships" xmlns:mc="http://schemas.openxmlformats.org/markup-compatibility/2006" xmlns:mv="urn:schemas-microsoft-com:mac:vml" xmlns:p="http://schemas.openxmlformats.org/presentationml/2006/main" xmlns:c="http://schemas.openxmlformats.org/drawingml/2006/chart" xmlns:dgm="http://schemas.openxmlformats.org/drawingml/2006/diagram" xmlns:o="urn:schemas-microsoft-com:office:office" xmlns:v="urn:schemas-microsoft-com:vml" xmlns:pvml="urn:schemas-microsoft-com:office:powerpoint" xmlns:com="http://schemas.openxmlformats.org/drawingml/2006/compatibility" xmlns:p14="http://schemas.microsoft.com/office/powerpoint/2010/main" xmlns:p15="http://schemas.microsoft.com/office/powerpoint/2012/main" xmlns:ahyp="http://schemas.microsoft.com/office/drawing/2018/hyperlinkcolor" showMasterPhAnim="0" showMasterSp="0">
   <p:cSld>
     <p:spTree>
       <p:nvGrpSpPr>
@@ -2366,7 +2366,7 @@
 </file>
 
 <file path=ppt/notesSlides/notesSlide18.xml><?xml version="1.0" encoding="utf-8"?>
-<p:notes xmlns:a="http://schemas.openxmlformats.org/drawingml/2006/main" xmlns:r="http://schemas.openxmlformats.org/officeDocument/2006/relationships" xmlns:mc="http://schemas.openxmlformats.org/markup-compatibility/2006" xmlns:mv="urn:schemas-microsoft-com:mac:vml" xmlns:p="http://schemas.openxmlformats.org/presentationml/2006/main" xmlns:c="http://schemas.openxmlformats.org/drawingml/2006/chart" xmlns:dgm="http://schemas.openxmlformats.org/drawingml/2006/diagram" xmlns:o="urn:schemas-microsoft-com:office:office" xmlns:v="urn:schemas-microsoft-com:vml" xmlns:pvml="urn:schemas-microsoft-com:office:powerpoint" xmlns:com="http://schemas.openxmlformats.org/drawingml/2006/compatibility" xmlns:p14="http://schemas.microsoft.com/office/powerpoint/2010/main" xmlns:p15="http://schemas.microsoft.com/office/powerpoint/2012/main" showMasterPhAnim="0" showMasterSp="0">
+<p:notes xmlns:a="http://schemas.openxmlformats.org/drawingml/2006/main" xmlns:r="http://schemas.openxmlformats.org/officeDocument/2006/relationships" xmlns:mc="http://schemas.openxmlformats.org/markup-compatibility/2006" xmlns:mv="urn:schemas-microsoft-com:mac:vml" xmlns:p="http://schemas.openxmlformats.org/presentationml/2006/main" xmlns:c="http://schemas.openxmlformats.org/drawingml/2006/chart" xmlns:dgm="http://schemas.openxmlformats.org/drawingml/2006/diagram" xmlns:o="urn:schemas-microsoft-com:office:office" xmlns:v="urn:schemas-microsoft-com:vml" xmlns:pvml="urn:schemas-microsoft-com:office:powerpoint" xmlns:com="http://schemas.openxmlformats.org/drawingml/2006/compatibility" xmlns:p14="http://schemas.microsoft.com/office/powerpoint/2010/main" xmlns:p15="http://schemas.microsoft.com/office/powerpoint/2012/main" xmlns:ahyp="http://schemas.microsoft.com/office/drawing/2018/hyperlinkcolor" showMasterPhAnim="0" showMasterSp="0">
   <p:cSld>
     <p:spTree>
       <p:nvGrpSpPr>
@@ -2722,7 +2722,7 @@
 </file>
 
 <file path=ppt/notesSlides/notesSlide19.xml><?xml version="1.0" encoding="utf-8"?>
-<p:notes xmlns:a="http://schemas.openxmlformats.org/drawingml/2006/main" xmlns:r="http://schemas.openxmlformats.org/officeDocument/2006/relationships" xmlns:mc="http://schemas.openxmlformats.org/markup-compatibility/2006" xmlns:mv="urn:schemas-microsoft-com:mac:vml" xmlns:p="http://schemas.openxmlformats.org/presentationml/2006/main" xmlns:c="http://schemas.openxmlformats.org/drawingml/2006/chart" xmlns:dgm="http://schemas.openxmlformats.org/drawingml/2006/diagram" xmlns:o="urn:schemas-microsoft-com:office:office" xmlns:v="urn:schemas-microsoft-com:vml" xmlns:pvml="urn:schemas-microsoft-com:office:powerpoint" xmlns:com="http://schemas.openxmlformats.org/drawingml/2006/compatibility" xmlns:p14="http://schemas.microsoft.com/office/powerpoint/2010/main" xmlns:p15="http://schemas.microsoft.com/office/powerpoint/2012/main" showMasterPhAnim="0" showMasterSp="0">
+<p:notes xmlns:a="http://schemas.openxmlformats.org/drawingml/2006/main" xmlns:r="http://schemas.openxmlformats.org/officeDocument/2006/relationships" xmlns:mc="http://schemas.openxmlformats.org/markup-compatibility/2006" xmlns:mv="urn:schemas-microsoft-com:mac:vml" xmlns:p="http://schemas.openxmlformats.org/presentationml/2006/main" xmlns:c="http://schemas.openxmlformats.org/drawingml/2006/chart" xmlns:dgm="http://schemas.openxmlformats.org/drawingml/2006/diagram" xmlns:o="urn:schemas-microsoft-com:office:office" xmlns:v="urn:schemas-microsoft-com:vml" xmlns:pvml="urn:schemas-microsoft-com:office:powerpoint" xmlns:com="http://schemas.openxmlformats.org/drawingml/2006/compatibility" xmlns:p14="http://schemas.microsoft.com/office/powerpoint/2010/main" xmlns:p15="http://schemas.microsoft.com/office/powerpoint/2012/main" xmlns:ahyp="http://schemas.microsoft.com/office/drawing/2018/hyperlinkcolor" showMasterPhAnim="0" showMasterSp="0">
   <p:cSld>
     <p:spTree>
       <p:nvGrpSpPr>
@@ -3092,7 +3092,7 @@
 </file>
 
 <file path=ppt/notesSlides/notesSlide2.xml><?xml version="1.0" encoding="utf-8"?>
-<p:notes xmlns:a="http://schemas.openxmlformats.org/drawingml/2006/main" xmlns:r="http://schemas.openxmlformats.org/officeDocument/2006/relationships" xmlns:mc="http://schemas.openxmlformats.org/markup-compatibility/2006" xmlns:mv="urn:schemas-microsoft-com:mac:vml" xmlns:p="http://schemas.openxmlformats.org/presentationml/2006/main" xmlns:c="http://schemas.openxmlformats.org/drawingml/2006/chart" xmlns:dgm="http://schemas.openxmlformats.org/drawingml/2006/diagram" xmlns:o="urn:schemas-microsoft-com:office:office" xmlns:v="urn:schemas-microsoft-com:vml" xmlns:pvml="urn:schemas-microsoft-com:office:powerpoint" xmlns:com="http://schemas.openxmlformats.org/drawingml/2006/compatibility" xmlns:p14="http://schemas.microsoft.com/office/powerpoint/2010/main" xmlns:p15="http://schemas.microsoft.com/office/powerpoint/2012/main" showMasterPhAnim="0" showMasterSp="0">
+<p:notes xmlns:a="http://schemas.openxmlformats.org/drawingml/2006/main" xmlns:r="http://schemas.openxmlformats.org/officeDocument/2006/relationships" xmlns:mc="http://schemas.openxmlformats.org/markup-compatibility/2006" xmlns:mv="urn:schemas-microsoft-com:mac:vml" xmlns:p="http://schemas.openxmlformats.org/presentationml/2006/main" xmlns:c="http://schemas.openxmlformats.org/drawingml/2006/chart" xmlns:dgm="http://schemas.openxmlformats.org/drawingml/2006/diagram" xmlns:o="urn:schemas-microsoft-com:office:office" xmlns:v="urn:schemas-microsoft-com:vml" xmlns:pvml="urn:schemas-microsoft-com:office:powerpoint" xmlns:com="http://schemas.openxmlformats.org/drawingml/2006/compatibility" xmlns:p14="http://schemas.microsoft.com/office/powerpoint/2010/main" xmlns:p15="http://schemas.microsoft.com/office/powerpoint/2012/main" xmlns:ahyp="http://schemas.microsoft.com/office/drawing/2018/hyperlinkcolor" showMasterPhAnim="0" showMasterSp="0">
   <p:cSld>
     <p:spTree>
       <p:nvGrpSpPr>
@@ -3191,7 +3191,7 @@
 </file>
 
 <file path=ppt/notesSlides/notesSlide20.xml><?xml version="1.0" encoding="utf-8"?>
-<p:notes xmlns:a="http://schemas.openxmlformats.org/drawingml/2006/main" xmlns:r="http://schemas.openxmlformats.org/officeDocument/2006/relationships" xmlns:mc="http://schemas.openxmlformats.org/markup-compatibility/2006" xmlns:mv="urn:schemas-microsoft-com:mac:vml" xmlns:p="http://schemas.openxmlformats.org/presentationml/2006/main" xmlns:c="http://schemas.openxmlformats.org/drawingml/2006/chart" xmlns:dgm="http://schemas.openxmlformats.org/drawingml/2006/diagram" xmlns:o="urn:schemas-microsoft-com:office:office" xmlns:v="urn:schemas-microsoft-com:vml" xmlns:pvml="urn:schemas-microsoft-com:office:powerpoint" xmlns:com="http://schemas.openxmlformats.org/drawingml/2006/compatibility" xmlns:p14="http://schemas.microsoft.com/office/powerpoint/2010/main" xmlns:p15="http://schemas.microsoft.com/office/powerpoint/2012/main" showMasterPhAnim="0" showMasterSp="0">
+<p:notes xmlns:a="http://schemas.openxmlformats.org/drawingml/2006/main" xmlns:r="http://schemas.openxmlformats.org/officeDocument/2006/relationships" xmlns:mc="http://schemas.openxmlformats.org/markup-compatibility/2006" xmlns:mv="urn:schemas-microsoft-com:mac:vml" xmlns:p="http://schemas.openxmlformats.org/presentationml/2006/main" xmlns:c="http://schemas.openxmlformats.org/drawingml/2006/chart" xmlns:dgm="http://schemas.openxmlformats.org/drawingml/2006/diagram" xmlns:o="urn:schemas-microsoft-com:office:office" xmlns:v="urn:schemas-microsoft-com:vml" xmlns:pvml="urn:schemas-microsoft-com:office:powerpoint" xmlns:com="http://schemas.openxmlformats.org/drawingml/2006/compatibility" xmlns:p14="http://schemas.microsoft.com/office/powerpoint/2010/main" xmlns:p15="http://schemas.microsoft.com/office/powerpoint/2012/main" xmlns:ahyp="http://schemas.microsoft.com/office/drawing/2018/hyperlinkcolor" showMasterPhAnim="0" showMasterSp="0">
   <p:cSld>
     <p:spTree>
       <p:nvGrpSpPr>
@@ -3515,7 +3515,7 @@
 </file>
 
 <file path=ppt/notesSlides/notesSlide21.xml><?xml version="1.0" encoding="utf-8"?>
-<p:notes xmlns:a="http://schemas.openxmlformats.org/drawingml/2006/main" xmlns:r="http://schemas.openxmlformats.org/officeDocument/2006/relationships" xmlns:mc="http://schemas.openxmlformats.org/markup-compatibility/2006" xmlns:mv="urn:schemas-microsoft-com:mac:vml" xmlns:p="http://schemas.openxmlformats.org/presentationml/2006/main" xmlns:c="http://schemas.openxmlformats.org/drawingml/2006/chart" xmlns:dgm="http://schemas.openxmlformats.org/drawingml/2006/diagram" xmlns:o="urn:schemas-microsoft-com:office:office" xmlns:v="urn:schemas-microsoft-com:vml" xmlns:pvml="urn:schemas-microsoft-com:office:powerpoint" xmlns:com="http://schemas.openxmlformats.org/drawingml/2006/compatibility" xmlns:p14="http://schemas.microsoft.com/office/powerpoint/2010/main" xmlns:p15="http://schemas.microsoft.com/office/powerpoint/2012/main" showMasterPhAnim="0" showMasterSp="0">
+<p:notes xmlns:a="http://schemas.openxmlformats.org/drawingml/2006/main" xmlns:r="http://schemas.openxmlformats.org/officeDocument/2006/relationships" xmlns:mc="http://schemas.openxmlformats.org/markup-compatibility/2006" xmlns:mv="urn:schemas-microsoft-com:mac:vml" xmlns:p="http://schemas.openxmlformats.org/presentationml/2006/main" xmlns:c="http://schemas.openxmlformats.org/drawingml/2006/chart" xmlns:dgm="http://schemas.openxmlformats.org/drawingml/2006/diagram" xmlns:o="urn:schemas-microsoft-com:office:office" xmlns:v="urn:schemas-microsoft-com:vml" xmlns:pvml="urn:schemas-microsoft-com:office:powerpoint" xmlns:com="http://schemas.openxmlformats.org/drawingml/2006/compatibility" xmlns:p14="http://schemas.microsoft.com/office/powerpoint/2010/main" xmlns:p15="http://schemas.microsoft.com/office/powerpoint/2012/main" xmlns:ahyp="http://schemas.microsoft.com/office/drawing/2018/hyperlinkcolor" showMasterPhAnim="0" showMasterSp="0">
   <p:cSld>
     <p:spTree>
       <p:nvGrpSpPr>
@@ -3614,7 +3614,7 @@
 </file>
 
 <file path=ppt/notesSlides/notesSlide22.xml><?xml version="1.0" encoding="utf-8"?>
-<p:notes xmlns:a="http://schemas.openxmlformats.org/drawingml/2006/main" xmlns:r="http://schemas.openxmlformats.org/officeDocument/2006/relationships" xmlns:mc="http://schemas.openxmlformats.org/markup-compatibility/2006" xmlns:mv="urn:schemas-microsoft-com:mac:vml" xmlns:p="http://schemas.openxmlformats.org/presentationml/2006/main" xmlns:c="http://schemas.openxmlformats.org/drawingml/2006/chart" xmlns:dgm="http://schemas.openxmlformats.org/drawingml/2006/diagram" xmlns:o="urn:schemas-microsoft-com:office:office" xmlns:v="urn:schemas-microsoft-com:vml" xmlns:pvml="urn:schemas-microsoft-com:office:powerpoint" xmlns:com="http://schemas.openxmlformats.org/drawingml/2006/compatibility" xmlns:p14="http://schemas.microsoft.com/office/powerpoint/2010/main" xmlns:p15="http://schemas.microsoft.com/office/powerpoint/2012/main" showMasterPhAnim="0" showMasterSp="0">
+<p:notes xmlns:a="http://schemas.openxmlformats.org/drawingml/2006/main" xmlns:r="http://schemas.openxmlformats.org/officeDocument/2006/relationships" xmlns:mc="http://schemas.openxmlformats.org/markup-compatibility/2006" xmlns:mv="urn:schemas-microsoft-com:mac:vml" xmlns:p="http://schemas.openxmlformats.org/presentationml/2006/main" xmlns:c="http://schemas.openxmlformats.org/drawingml/2006/chart" xmlns:dgm="http://schemas.openxmlformats.org/drawingml/2006/diagram" xmlns:o="urn:schemas-microsoft-com:office:office" xmlns:v="urn:schemas-microsoft-com:vml" xmlns:pvml="urn:schemas-microsoft-com:office:powerpoint" xmlns:com="http://schemas.openxmlformats.org/drawingml/2006/compatibility" xmlns:p14="http://schemas.microsoft.com/office/powerpoint/2010/main" xmlns:p15="http://schemas.microsoft.com/office/powerpoint/2012/main" xmlns:ahyp="http://schemas.microsoft.com/office/drawing/2018/hyperlinkcolor" showMasterPhAnim="0" showMasterSp="0">
   <p:cSld>
     <p:spTree>
       <p:nvGrpSpPr>
@@ -3713,7 +3713,7 @@
 </file>
 
 <file path=ppt/notesSlides/notesSlide23.xml><?xml version="1.0" encoding="utf-8"?>
-<p:notes xmlns:a="http://schemas.openxmlformats.org/drawingml/2006/main" xmlns:r="http://schemas.openxmlformats.org/officeDocument/2006/relationships" xmlns:mc="http://schemas.openxmlformats.org/markup-compatibility/2006" xmlns:mv="urn:schemas-microsoft-com:mac:vml" xmlns:p="http://schemas.openxmlformats.org/presentationml/2006/main" xmlns:c="http://schemas.openxmlformats.org/drawingml/2006/chart" xmlns:dgm="http://schemas.openxmlformats.org/drawingml/2006/diagram" xmlns:o="urn:schemas-microsoft-com:office:office" xmlns:v="urn:schemas-microsoft-com:vml" xmlns:pvml="urn:schemas-microsoft-com:office:powerpoint" xmlns:com="http://schemas.openxmlformats.org/drawingml/2006/compatibility" xmlns:p14="http://schemas.microsoft.com/office/powerpoint/2010/main" xmlns:p15="http://schemas.microsoft.com/office/powerpoint/2012/main" showMasterPhAnim="0" showMasterSp="0">
+<p:notes xmlns:a="http://schemas.openxmlformats.org/drawingml/2006/main" xmlns:r="http://schemas.openxmlformats.org/officeDocument/2006/relationships" xmlns:mc="http://schemas.openxmlformats.org/markup-compatibility/2006" xmlns:mv="urn:schemas-microsoft-com:mac:vml" xmlns:p="http://schemas.openxmlformats.org/presentationml/2006/main" xmlns:c="http://schemas.openxmlformats.org/drawingml/2006/chart" xmlns:dgm="http://schemas.openxmlformats.org/drawingml/2006/diagram" xmlns:o="urn:schemas-microsoft-com:office:office" xmlns:v="urn:schemas-microsoft-com:vml" xmlns:pvml="urn:schemas-microsoft-com:office:powerpoint" xmlns:com="http://schemas.openxmlformats.org/drawingml/2006/compatibility" xmlns:p14="http://schemas.microsoft.com/office/powerpoint/2010/main" xmlns:p15="http://schemas.microsoft.com/office/powerpoint/2012/main" xmlns:ahyp="http://schemas.microsoft.com/office/drawing/2018/hyperlinkcolor" showMasterPhAnim="0" showMasterSp="0">
   <p:cSld>
     <p:spTree>
       <p:nvGrpSpPr>
@@ -3856,7 +3856,7 @@
 </file>
 
 <file path=ppt/notesSlides/notesSlide24.xml><?xml version="1.0" encoding="utf-8"?>
-<p:notes xmlns:a="http://schemas.openxmlformats.org/drawingml/2006/main" xmlns:r="http://schemas.openxmlformats.org/officeDocument/2006/relationships" xmlns:mc="http://schemas.openxmlformats.org/markup-compatibility/2006" xmlns:mv="urn:schemas-microsoft-com:mac:vml" xmlns:p="http://schemas.openxmlformats.org/presentationml/2006/main" xmlns:c="http://schemas.openxmlformats.org/drawingml/2006/chart" xmlns:dgm="http://schemas.openxmlformats.org/drawingml/2006/diagram" xmlns:o="urn:schemas-microsoft-com:office:office" xmlns:v="urn:schemas-microsoft-com:vml" xmlns:pvml="urn:schemas-microsoft-com:office:powerpoint" xmlns:com="http://schemas.openxmlformats.org/drawingml/2006/compatibility" xmlns:p14="http://schemas.microsoft.com/office/powerpoint/2010/main" xmlns:p15="http://schemas.microsoft.com/office/powerpoint/2012/main" showMasterPhAnim="0" showMasterSp="0">
+<p:notes xmlns:a="http://schemas.openxmlformats.org/drawingml/2006/main" xmlns:r="http://schemas.openxmlformats.org/officeDocument/2006/relationships" xmlns:mc="http://schemas.openxmlformats.org/markup-compatibility/2006" xmlns:mv="urn:schemas-microsoft-com:mac:vml" xmlns:p="http://schemas.openxmlformats.org/presentationml/2006/main" xmlns:c="http://schemas.openxmlformats.org/drawingml/2006/chart" xmlns:dgm="http://schemas.openxmlformats.org/drawingml/2006/diagram" xmlns:o="urn:schemas-microsoft-com:office:office" xmlns:v="urn:schemas-microsoft-com:vml" xmlns:pvml="urn:schemas-microsoft-com:office:powerpoint" xmlns:com="http://schemas.openxmlformats.org/drawingml/2006/compatibility" xmlns:p14="http://schemas.microsoft.com/office/powerpoint/2010/main" xmlns:p15="http://schemas.microsoft.com/office/powerpoint/2012/main" xmlns:ahyp="http://schemas.microsoft.com/office/drawing/2018/hyperlinkcolor" showMasterPhAnim="0" showMasterSp="0">
   <p:cSld>
     <p:spTree>
       <p:nvGrpSpPr>
@@ -3955,7 +3955,7 @@
 </file>
 
 <file path=ppt/notesSlides/notesSlide3.xml><?xml version="1.0" encoding="utf-8"?>
-<p:notes xmlns:a="http://schemas.openxmlformats.org/drawingml/2006/main" xmlns:r="http://schemas.openxmlformats.org/officeDocument/2006/relationships" xmlns:mc="http://schemas.openxmlformats.org/markup-compatibility/2006" xmlns:mv="urn:schemas-microsoft-com:mac:vml" xmlns:p="http://schemas.openxmlformats.org/presentationml/2006/main" xmlns:c="http://schemas.openxmlformats.org/drawingml/2006/chart" xmlns:dgm="http://schemas.openxmlformats.org/drawingml/2006/diagram" xmlns:o="urn:schemas-microsoft-com:office:office" xmlns:v="urn:schemas-microsoft-com:vml" xmlns:pvml="urn:schemas-microsoft-com:office:powerpoint" xmlns:com="http://schemas.openxmlformats.org/drawingml/2006/compatibility" xmlns:p14="http://schemas.microsoft.com/office/powerpoint/2010/main" xmlns:p15="http://schemas.microsoft.com/office/powerpoint/2012/main" showMasterPhAnim="0" showMasterSp="0">
+<p:notes xmlns:a="http://schemas.openxmlformats.org/drawingml/2006/main" xmlns:r="http://schemas.openxmlformats.org/officeDocument/2006/relationships" xmlns:mc="http://schemas.openxmlformats.org/markup-compatibility/2006" xmlns:mv="urn:schemas-microsoft-com:mac:vml" xmlns:p="http://schemas.openxmlformats.org/presentationml/2006/main" xmlns:c="http://schemas.openxmlformats.org/drawingml/2006/chart" xmlns:dgm="http://schemas.openxmlformats.org/drawingml/2006/diagram" xmlns:o="urn:schemas-microsoft-com:office:office" xmlns:v="urn:schemas-microsoft-com:vml" xmlns:pvml="urn:schemas-microsoft-com:office:powerpoint" xmlns:com="http://schemas.openxmlformats.org/drawingml/2006/compatibility" xmlns:p14="http://schemas.microsoft.com/office/powerpoint/2010/main" xmlns:p15="http://schemas.microsoft.com/office/powerpoint/2012/main" xmlns:ahyp="http://schemas.microsoft.com/office/drawing/2018/hyperlinkcolor" showMasterPhAnim="0" showMasterSp="0">
   <p:cSld>
     <p:spTree>
       <p:nvGrpSpPr>
@@ -4054,7 +4054,7 @@
 </file>
 
 <file path=ppt/notesSlides/notesSlide4.xml><?xml version="1.0" encoding="utf-8"?>
-<p:notes xmlns:a="http://schemas.openxmlformats.org/drawingml/2006/main" xmlns:r="http://schemas.openxmlformats.org/officeDocument/2006/relationships" xmlns:mc="http://schemas.openxmlformats.org/markup-compatibility/2006" xmlns:mv="urn:schemas-microsoft-com:mac:vml" xmlns:p="http://schemas.openxmlformats.org/presentationml/2006/main" xmlns:c="http://schemas.openxmlformats.org/drawingml/2006/chart" xmlns:dgm="http://schemas.openxmlformats.org/drawingml/2006/diagram" xmlns:o="urn:schemas-microsoft-com:office:office" xmlns:v="urn:schemas-microsoft-com:vml" xmlns:pvml="urn:schemas-microsoft-com:office:powerpoint" xmlns:com="http://schemas.openxmlformats.org/drawingml/2006/compatibility" xmlns:p14="http://schemas.microsoft.com/office/powerpoint/2010/main" xmlns:p15="http://schemas.microsoft.com/office/powerpoint/2012/main" showMasterPhAnim="0" showMasterSp="0">
+<p:notes xmlns:a="http://schemas.openxmlformats.org/drawingml/2006/main" xmlns:r="http://schemas.openxmlformats.org/officeDocument/2006/relationships" xmlns:mc="http://schemas.openxmlformats.org/markup-compatibility/2006" xmlns:mv="urn:schemas-microsoft-com:mac:vml" xmlns:p="http://schemas.openxmlformats.org/presentationml/2006/main" xmlns:c="http://schemas.openxmlformats.org/drawingml/2006/chart" xmlns:dgm="http://schemas.openxmlformats.org/drawingml/2006/diagram" xmlns:o="urn:schemas-microsoft-com:office:office" xmlns:v="urn:schemas-microsoft-com:vml" xmlns:pvml="urn:schemas-microsoft-com:office:powerpoint" xmlns:com="http://schemas.openxmlformats.org/drawingml/2006/compatibility" xmlns:p14="http://schemas.microsoft.com/office/powerpoint/2010/main" xmlns:p15="http://schemas.microsoft.com/office/powerpoint/2012/main" xmlns:ahyp="http://schemas.microsoft.com/office/drawing/2018/hyperlinkcolor" showMasterPhAnim="0" showMasterSp="0">
   <p:cSld>
     <p:spTree>
       <p:nvGrpSpPr>
@@ -4153,7 +4153,7 @@
 </file>
 
 <file path=ppt/notesSlides/notesSlide5.xml><?xml version="1.0" encoding="utf-8"?>
-<p:notes xmlns:a="http://schemas.openxmlformats.org/drawingml/2006/main" xmlns:r="http://schemas.openxmlformats.org/officeDocument/2006/relationships" xmlns:mc="http://schemas.openxmlformats.org/markup-compatibility/2006" xmlns:mv="urn:schemas-microsoft-com:mac:vml" xmlns:p="http://schemas.openxmlformats.org/presentationml/2006/main" xmlns:c="http://schemas.openxmlformats.org/drawingml/2006/chart" xmlns:dgm="http://schemas.openxmlformats.org/drawingml/2006/diagram" xmlns:o="urn:schemas-microsoft-com:office:office" xmlns:v="urn:schemas-microsoft-com:vml" xmlns:pvml="urn:schemas-microsoft-com:office:powerpoint" xmlns:com="http://schemas.openxmlformats.org/drawingml/2006/compatibility" xmlns:p14="http://schemas.microsoft.com/office/powerpoint/2010/main" xmlns:p15="http://schemas.microsoft.com/office/powerpoint/2012/main" showMasterPhAnim="0" showMasterSp="0">
+<p:notes xmlns:a="http://schemas.openxmlformats.org/drawingml/2006/main" xmlns:r="http://schemas.openxmlformats.org/officeDocument/2006/relationships" xmlns:mc="http://schemas.openxmlformats.org/markup-compatibility/2006" xmlns:mv="urn:schemas-microsoft-com:mac:vml" xmlns:p="http://schemas.openxmlformats.org/presentationml/2006/main" xmlns:c="http://schemas.openxmlformats.org/drawingml/2006/chart" xmlns:dgm="http://schemas.openxmlformats.org/drawingml/2006/diagram" xmlns:o="urn:schemas-microsoft-com:office:office" xmlns:v="urn:schemas-microsoft-com:vml" xmlns:pvml="urn:schemas-microsoft-com:office:powerpoint" xmlns:com="http://schemas.openxmlformats.org/drawingml/2006/compatibility" xmlns:p14="http://schemas.microsoft.com/office/powerpoint/2010/main" xmlns:p15="http://schemas.microsoft.com/office/powerpoint/2012/main" xmlns:ahyp="http://schemas.microsoft.com/office/drawing/2018/hyperlinkcolor" showMasterPhAnim="0" showMasterSp="0">
   <p:cSld>
     <p:spTree>
       <p:nvGrpSpPr>
@@ -4252,7 +4252,7 @@
 </file>
 
 <file path=ppt/notesSlides/notesSlide6.xml><?xml version="1.0" encoding="utf-8"?>
-<p:notes xmlns:a="http://schemas.openxmlformats.org/drawingml/2006/main" xmlns:r="http://schemas.openxmlformats.org/officeDocument/2006/relationships" xmlns:mc="http://schemas.openxmlformats.org/markup-compatibility/2006" xmlns:mv="urn:schemas-microsoft-com:mac:vml" xmlns:p="http://schemas.openxmlformats.org/presentationml/2006/main" xmlns:c="http://schemas.openxmlformats.org/drawingml/2006/chart" xmlns:dgm="http://schemas.openxmlformats.org/drawingml/2006/diagram" xmlns:o="urn:schemas-microsoft-com:office:office" xmlns:v="urn:schemas-microsoft-com:vml" xmlns:pvml="urn:schemas-microsoft-com:office:powerpoint" xmlns:com="http://schemas.openxmlformats.org/drawingml/2006/compatibility" xmlns:p14="http://schemas.microsoft.com/office/powerpoint/2010/main" xmlns:p15="http://schemas.microsoft.com/office/powerpoint/2012/main" showMasterPhAnim="0" showMasterSp="0">
+<p:notes xmlns:a="http://schemas.openxmlformats.org/drawingml/2006/main" xmlns:r="http://schemas.openxmlformats.org/officeDocument/2006/relationships" xmlns:mc="http://schemas.openxmlformats.org/markup-compatibility/2006" xmlns:mv="urn:schemas-microsoft-com:mac:vml" xmlns:p="http://schemas.openxmlformats.org/presentationml/2006/main" xmlns:c="http://schemas.openxmlformats.org/drawingml/2006/chart" xmlns:dgm="http://schemas.openxmlformats.org/drawingml/2006/diagram" xmlns:o="urn:schemas-microsoft-com:office:office" xmlns:v="urn:schemas-microsoft-com:vml" xmlns:pvml="urn:schemas-microsoft-com:office:powerpoint" xmlns:com="http://schemas.openxmlformats.org/drawingml/2006/compatibility" xmlns:p14="http://schemas.microsoft.com/office/powerpoint/2010/main" xmlns:p15="http://schemas.microsoft.com/office/powerpoint/2012/main" xmlns:ahyp="http://schemas.microsoft.com/office/drawing/2018/hyperlinkcolor" showMasterPhAnim="0" showMasterSp="0">
   <p:cSld>
     <p:spTree>
       <p:nvGrpSpPr>
@@ -4351,7 +4351,7 @@
 </file>
 
 <file path=ppt/notesSlides/notesSlide7.xml><?xml version="1.0" encoding="utf-8"?>
-<p:notes xmlns:a="http://schemas.openxmlformats.org/drawingml/2006/main" xmlns:r="http://schemas.openxmlformats.org/officeDocument/2006/relationships" xmlns:mc="http://schemas.openxmlformats.org/markup-compatibility/2006" xmlns:mv="urn:schemas-microsoft-com:mac:vml" xmlns:p="http://schemas.openxmlformats.org/presentationml/2006/main" xmlns:c="http://schemas.openxmlformats.org/drawingml/2006/chart" xmlns:dgm="http://schemas.openxmlformats.org/drawingml/2006/diagram" xmlns:o="urn:schemas-microsoft-com:office:office" xmlns:v="urn:schemas-microsoft-com:vml" xmlns:pvml="urn:schemas-microsoft-com:office:powerpoint" xmlns:com="http://schemas.openxmlformats.org/drawingml/2006/compatibility" xmlns:p14="http://schemas.microsoft.com/office/powerpoint/2010/main" xmlns:p15="http://schemas.microsoft.com/office/powerpoint/2012/main" showMasterPhAnim="0" showMasterSp="0">
+<p:notes xmlns:a="http://schemas.openxmlformats.org/drawingml/2006/main" xmlns:r="http://schemas.openxmlformats.org/officeDocument/2006/relationships" xmlns:mc="http://schemas.openxmlformats.org/markup-compatibility/2006" xmlns:mv="urn:schemas-microsoft-com:mac:vml" xmlns:p="http://schemas.openxmlformats.org/presentationml/2006/main" xmlns:c="http://schemas.openxmlformats.org/drawingml/2006/chart" xmlns:dgm="http://schemas.openxmlformats.org/drawingml/2006/diagram" xmlns:o="urn:schemas-microsoft-com:office:office" xmlns:v="urn:schemas-microsoft-com:vml" xmlns:pvml="urn:schemas-microsoft-com:office:powerpoint" xmlns:com="http://schemas.openxmlformats.org/drawingml/2006/compatibility" xmlns:p14="http://schemas.microsoft.com/office/powerpoint/2010/main" xmlns:p15="http://schemas.microsoft.com/office/powerpoint/2012/main" xmlns:ahyp="http://schemas.microsoft.com/office/drawing/2018/hyperlinkcolor" showMasterPhAnim="0" showMasterSp="0">
   <p:cSld>
     <p:spTree>
       <p:nvGrpSpPr>
@@ -4450,7 +4450,7 @@
 </file>
 
 <file path=ppt/notesSlides/notesSlide8.xml><?xml version="1.0" encoding="utf-8"?>
-<p:notes xmlns:a="http://schemas.openxmlformats.org/drawingml/2006/main" xmlns:r="http://schemas.openxmlformats.org/officeDocument/2006/relationships" xmlns:mc="http://schemas.openxmlformats.org/markup-compatibility/2006" xmlns:mv="urn:schemas-microsoft-com:mac:vml" xmlns:p="http://schemas.openxmlformats.org/presentationml/2006/main" xmlns:c="http://schemas.openxmlformats.org/drawingml/2006/chart" xmlns:dgm="http://schemas.openxmlformats.org/drawingml/2006/diagram" xmlns:o="urn:schemas-microsoft-com:office:office" xmlns:v="urn:schemas-microsoft-com:vml" xmlns:pvml="urn:schemas-microsoft-com:office:powerpoint" xmlns:com="http://schemas.openxmlformats.org/drawingml/2006/compatibility" xmlns:p14="http://schemas.microsoft.com/office/powerpoint/2010/main" xmlns:p15="http://schemas.microsoft.com/office/powerpoint/2012/main" showMasterPhAnim="0" showMasterSp="0">
+<p:notes xmlns:a="http://schemas.openxmlformats.org/drawingml/2006/main" xmlns:r="http://schemas.openxmlformats.org/officeDocument/2006/relationships" xmlns:mc="http://schemas.openxmlformats.org/markup-compatibility/2006" xmlns:mv="urn:schemas-microsoft-com:mac:vml" xmlns:p="http://schemas.openxmlformats.org/presentationml/2006/main" xmlns:c="http://schemas.openxmlformats.org/drawingml/2006/chart" xmlns:dgm="http://schemas.openxmlformats.org/drawingml/2006/diagram" xmlns:o="urn:schemas-microsoft-com:office:office" xmlns:v="urn:schemas-microsoft-com:vml" xmlns:pvml="urn:schemas-microsoft-com:office:powerpoint" xmlns:com="http://schemas.openxmlformats.org/drawingml/2006/compatibility" xmlns:p14="http://schemas.microsoft.com/office/powerpoint/2010/main" xmlns:p15="http://schemas.microsoft.com/office/powerpoint/2012/main" xmlns:ahyp="http://schemas.microsoft.com/office/drawing/2018/hyperlinkcolor" showMasterPhAnim="0" showMasterSp="0">
   <p:cSld>
     <p:spTree>
       <p:nvGrpSpPr>
@@ -4549,7 +4549,7 @@
 </file>
 
 <file path=ppt/notesSlides/notesSlide9.xml><?xml version="1.0" encoding="utf-8"?>
-<p:notes xmlns:a="http://schemas.openxmlformats.org/drawingml/2006/main" xmlns:r="http://schemas.openxmlformats.org/officeDocument/2006/relationships" xmlns:mc="http://schemas.openxmlformats.org/markup-compatibility/2006" xmlns:mv="urn:schemas-microsoft-com:mac:vml" xmlns:p="http://schemas.openxmlformats.org/presentationml/2006/main" xmlns:c="http://schemas.openxmlformats.org/drawingml/2006/chart" xmlns:dgm="http://schemas.openxmlformats.org/drawingml/2006/diagram" xmlns:o="urn:schemas-microsoft-com:office:office" xmlns:v="urn:schemas-microsoft-com:vml" xmlns:pvml="urn:schemas-microsoft-com:office:powerpoint" xmlns:com="http://schemas.openxmlformats.org/drawingml/2006/compatibility" xmlns:p14="http://schemas.microsoft.com/office/powerpoint/2010/main" xmlns:p15="http://schemas.microsoft.com/office/powerpoint/2012/main" showMasterPhAnim="0" showMasterSp="0">
+<p:notes xmlns:a="http://schemas.openxmlformats.org/drawingml/2006/main" xmlns:r="http://schemas.openxmlformats.org/officeDocument/2006/relationships" xmlns:mc="http://schemas.openxmlformats.org/markup-compatibility/2006" xmlns:mv="urn:schemas-microsoft-com:mac:vml" xmlns:p="http://schemas.openxmlformats.org/presentationml/2006/main" xmlns:c="http://schemas.openxmlformats.org/drawingml/2006/chart" xmlns:dgm="http://schemas.openxmlformats.org/drawingml/2006/diagram" xmlns:o="urn:schemas-microsoft-com:office:office" xmlns:v="urn:schemas-microsoft-com:vml" xmlns:pvml="urn:schemas-microsoft-com:office:powerpoint" xmlns:com="http://schemas.openxmlformats.org/drawingml/2006/compatibility" xmlns:p14="http://schemas.microsoft.com/office/powerpoint/2010/main" xmlns:p15="http://schemas.microsoft.com/office/powerpoint/2012/main" xmlns:ahyp="http://schemas.microsoft.com/office/drawing/2018/hyperlinkcolor" showMasterPhAnim="0" showMasterSp="0">
   <p:cSld>
     <p:spTree>
       <p:nvGrpSpPr>
@@ -4648,7 +4648,7 @@
 </file>
 
 <file path=ppt/slideLayouts/slideLayout1.xml><?xml version="1.0" encoding="utf-8"?>
-<p:sldLayout xmlns:a="http://schemas.openxmlformats.org/drawingml/2006/main" xmlns:r="http://schemas.openxmlformats.org/officeDocument/2006/relationships" xmlns:mc="http://schemas.openxmlformats.org/markup-compatibility/2006" xmlns:mv="urn:schemas-microsoft-com:mac:vml" xmlns:p="http://schemas.openxmlformats.org/presentationml/2006/main" xmlns:c="http://schemas.openxmlformats.org/drawingml/2006/chart" xmlns:dgm="http://schemas.openxmlformats.org/drawingml/2006/diagram" xmlns:o="urn:schemas-microsoft-com:office:office" xmlns:v="urn:schemas-microsoft-com:vml" xmlns:pvml="urn:schemas-microsoft-com:office:powerpoint" xmlns:com="http://schemas.openxmlformats.org/drawingml/2006/compatibility" xmlns:p14="http://schemas.microsoft.com/office/powerpoint/2010/main" xmlns:p15="http://schemas.microsoft.com/office/powerpoint/2012/main" matchingName="Title Slide" type="title">
+<p:sldLayout xmlns:a="http://schemas.openxmlformats.org/drawingml/2006/main" xmlns:r="http://schemas.openxmlformats.org/officeDocument/2006/relationships" xmlns:mc="http://schemas.openxmlformats.org/markup-compatibility/2006" xmlns:mv="urn:schemas-microsoft-com:mac:vml" xmlns:p="http://schemas.openxmlformats.org/presentationml/2006/main" xmlns:c="http://schemas.openxmlformats.org/drawingml/2006/chart" xmlns:dgm="http://schemas.openxmlformats.org/drawingml/2006/diagram" xmlns:o="urn:schemas-microsoft-com:office:office" xmlns:v="urn:schemas-microsoft-com:vml" xmlns:pvml="urn:schemas-microsoft-com:office:powerpoint" xmlns:com="http://schemas.openxmlformats.org/drawingml/2006/compatibility" xmlns:p14="http://schemas.microsoft.com/office/powerpoint/2010/main" xmlns:p15="http://schemas.microsoft.com/office/powerpoint/2012/main" xmlns:ahyp="http://schemas.microsoft.com/office/drawing/2018/hyperlinkcolor" matchingName="Title Slide" type="title">
   <p:cSld name="TITLE">
     <p:spTree>
       <p:nvGrpSpPr>
@@ -4997,7 +4997,7 @@
 </file>
 
 <file path=ppt/slideLayouts/slideLayout10.xml><?xml version="1.0" encoding="utf-8"?>
-<p:sldLayout xmlns:a="http://schemas.openxmlformats.org/drawingml/2006/main" xmlns:r="http://schemas.openxmlformats.org/officeDocument/2006/relationships" xmlns:mc="http://schemas.openxmlformats.org/markup-compatibility/2006" xmlns:mv="urn:schemas-microsoft-com:mac:vml" xmlns:p="http://schemas.openxmlformats.org/presentationml/2006/main" xmlns:c="http://schemas.openxmlformats.org/drawingml/2006/chart" xmlns:dgm="http://schemas.openxmlformats.org/drawingml/2006/diagram" xmlns:o="urn:schemas-microsoft-com:office:office" xmlns:v="urn:schemas-microsoft-com:vml" xmlns:pvml="urn:schemas-microsoft-com:office:powerpoint" xmlns:com="http://schemas.openxmlformats.org/drawingml/2006/compatibility" xmlns:p14="http://schemas.microsoft.com/office/powerpoint/2010/main" xmlns:p15="http://schemas.microsoft.com/office/powerpoint/2012/main" matchingName="Picture with Caption" type="picTx">
+<p:sldLayout xmlns:a="http://schemas.openxmlformats.org/drawingml/2006/main" xmlns:r="http://schemas.openxmlformats.org/officeDocument/2006/relationships" xmlns:mc="http://schemas.openxmlformats.org/markup-compatibility/2006" xmlns:mv="urn:schemas-microsoft-com:mac:vml" xmlns:p="http://schemas.openxmlformats.org/presentationml/2006/main" xmlns:c="http://schemas.openxmlformats.org/drawingml/2006/chart" xmlns:dgm="http://schemas.openxmlformats.org/drawingml/2006/diagram" xmlns:o="urn:schemas-microsoft-com:office:office" xmlns:v="urn:schemas-microsoft-com:vml" xmlns:pvml="urn:schemas-microsoft-com:office:powerpoint" xmlns:com="http://schemas.openxmlformats.org/drawingml/2006/compatibility" xmlns:p14="http://schemas.microsoft.com/office/powerpoint/2010/main" xmlns:p15="http://schemas.microsoft.com/office/powerpoint/2012/main" xmlns:ahyp="http://schemas.microsoft.com/office/drawing/2018/hyperlinkcolor" matchingName="Picture with Caption" type="picTx">
   <p:cSld name="PICTURE_WITH_CAPTION_TEXT">
     <p:spTree>
       <p:nvGrpSpPr>
@@ -6130,7 +6130,7 @@
 </file>
 
 <file path=ppt/slideLayouts/slideLayout11.xml><?xml version="1.0" encoding="utf-8"?>
-<p:sldLayout xmlns:a="http://schemas.openxmlformats.org/drawingml/2006/main" xmlns:r="http://schemas.openxmlformats.org/officeDocument/2006/relationships" xmlns:mc="http://schemas.openxmlformats.org/markup-compatibility/2006" xmlns:mv="urn:schemas-microsoft-com:mac:vml" xmlns:p="http://schemas.openxmlformats.org/presentationml/2006/main" xmlns:c="http://schemas.openxmlformats.org/drawingml/2006/chart" xmlns:dgm="http://schemas.openxmlformats.org/drawingml/2006/diagram" xmlns:o="urn:schemas-microsoft-com:office:office" xmlns:v="urn:schemas-microsoft-com:vml" xmlns:pvml="urn:schemas-microsoft-com:office:powerpoint" xmlns:com="http://schemas.openxmlformats.org/drawingml/2006/compatibility" xmlns:p14="http://schemas.microsoft.com/office/powerpoint/2010/main" xmlns:p15="http://schemas.microsoft.com/office/powerpoint/2012/main" matchingName="Title and Vertical Text" type="vertTx">
+<p:sldLayout xmlns:a="http://schemas.openxmlformats.org/drawingml/2006/main" xmlns:r="http://schemas.openxmlformats.org/officeDocument/2006/relationships" xmlns:mc="http://schemas.openxmlformats.org/markup-compatibility/2006" xmlns:mv="urn:schemas-microsoft-com:mac:vml" xmlns:p="http://schemas.openxmlformats.org/presentationml/2006/main" xmlns:c="http://schemas.openxmlformats.org/drawingml/2006/chart" xmlns:dgm="http://schemas.openxmlformats.org/drawingml/2006/diagram" xmlns:o="urn:schemas-microsoft-com:office:office" xmlns:v="urn:schemas-microsoft-com:vml" xmlns:pvml="urn:schemas-microsoft-com:office:powerpoint" xmlns:com="http://schemas.openxmlformats.org/drawingml/2006/compatibility" xmlns:p14="http://schemas.microsoft.com/office/powerpoint/2010/main" xmlns:p15="http://schemas.microsoft.com/office/powerpoint/2012/main" xmlns:ahyp="http://schemas.microsoft.com/office/drawing/2018/hyperlinkcolor" matchingName="Title and Vertical Text" type="vertTx">
   <p:cSld name="VERTICAL_TEXT">
     <p:spTree>
       <p:nvGrpSpPr>
@@ -7025,7 +7025,7 @@
 </file>
 
 <file path=ppt/slideLayouts/slideLayout12.xml><?xml version="1.0" encoding="utf-8"?>
-<p:sldLayout xmlns:a="http://schemas.openxmlformats.org/drawingml/2006/main" xmlns:r="http://schemas.openxmlformats.org/officeDocument/2006/relationships" xmlns:mc="http://schemas.openxmlformats.org/markup-compatibility/2006" xmlns:mv="urn:schemas-microsoft-com:mac:vml" xmlns:p="http://schemas.openxmlformats.org/presentationml/2006/main" xmlns:c="http://schemas.openxmlformats.org/drawingml/2006/chart" xmlns:dgm="http://schemas.openxmlformats.org/drawingml/2006/diagram" xmlns:o="urn:schemas-microsoft-com:office:office" xmlns:v="urn:schemas-microsoft-com:vml" xmlns:pvml="urn:schemas-microsoft-com:office:powerpoint" xmlns:com="http://schemas.openxmlformats.org/drawingml/2006/compatibility" xmlns:p14="http://schemas.microsoft.com/office/powerpoint/2010/main" xmlns:p15="http://schemas.microsoft.com/office/powerpoint/2012/main" matchingName="Vertical Title and Text" type="vertTitleAndTx">
+<p:sldLayout xmlns:a="http://schemas.openxmlformats.org/drawingml/2006/main" xmlns:r="http://schemas.openxmlformats.org/officeDocument/2006/relationships" xmlns:mc="http://schemas.openxmlformats.org/markup-compatibility/2006" xmlns:mv="urn:schemas-microsoft-com:mac:vml" xmlns:p="http://schemas.openxmlformats.org/presentationml/2006/main" xmlns:c="http://schemas.openxmlformats.org/drawingml/2006/chart" xmlns:dgm="http://schemas.openxmlformats.org/drawingml/2006/diagram" xmlns:o="urn:schemas-microsoft-com:office:office" xmlns:v="urn:schemas-microsoft-com:vml" xmlns:pvml="urn:schemas-microsoft-com:office:powerpoint" xmlns:com="http://schemas.openxmlformats.org/drawingml/2006/compatibility" xmlns:p14="http://schemas.microsoft.com/office/powerpoint/2010/main" xmlns:p15="http://schemas.microsoft.com/office/powerpoint/2012/main" xmlns:ahyp="http://schemas.microsoft.com/office/drawing/2018/hyperlinkcolor" matchingName="Vertical Title and Text" type="vertTitleAndTx">
   <p:cSld name="VERTICAL_TITLE_AND_VERTICAL_TEXT">
     <p:spTree>
       <p:nvGrpSpPr>
@@ -7920,7 +7920,7 @@
 </file>
 
 <file path=ppt/slideLayouts/slideLayout2.xml><?xml version="1.0" encoding="utf-8"?>
-<p:sldLayout xmlns:a="http://schemas.openxmlformats.org/drawingml/2006/main" xmlns:r="http://schemas.openxmlformats.org/officeDocument/2006/relationships" xmlns:mc="http://schemas.openxmlformats.org/markup-compatibility/2006" xmlns:mv="urn:schemas-microsoft-com:mac:vml" xmlns:p="http://schemas.openxmlformats.org/presentationml/2006/main" xmlns:c="http://schemas.openxmlformats.org/drawingml/2006/chart" xmlns:dgm="http://schemas.openxmlformats.org/drawingml/2006/diagram" xmlns:o="urn:schemas-microsoft-com:office:office" xmlns:v="urn:schemas-microsoft-com:vml" xmlns:pvml="urn:schemas-microsoft-com:office:powerpoint" xmlns:com="http://schemas.openxmlformats.org/drawingml/2006/compatibility" xmlns:p14="http://schemas.microsoft.com/office/powerpoint/2010/main" xmlns:p15="http://schemas.microsoft.com/office/powerpoint/2012/main" matchingName="Title and Content" type="obj">
+<p:sldLayout xmlns:a="http://schemas.openxmlformats.org/drawingml/2006/main" xmlns:r="http://schemas.openxmlformats.org/officeDocument/2006/relationships" xmlns:mc="http://schemas.openxmlformats.org/markup-compatibility/2006" xmlns:mv="urn:schemas-microsoft-com:mac:vml" xmlns:p="http://schemas.openxmlformats.org/presentationml/2006/main" xmlns:c="http://schemas.openxmlformats.org/drawingml/2006/chart" xmlns:dgm="http://schemas.openxmlformats.org/drawingml/2006/diagram" xmlns:o="urn:schemas-microsoft-com:office:office" xmlns:v="urn:schemas-microsoft-com:vml" xmlns:pvml="urn:schemas-microsoft-com:office:powerpoint" xmlns:com="http://schemas.openxmlformats.org/drawingml/2006/compatibility" xmlns:p14="http://schemas.microsoft.com/office/powerpoint/2010/main" xmlns:p15="http://schemas.microsoft.com/office/powerpoint/2012/main" xmlns:ahyp="http://schemas.microsoft.com/office/drawing/2018/hyperlinkcolor" matchingName="Title and Content" type="obj">
   <p:cSld name="OBJECT">
     <p:spTree>
       <p:nvGrpSpPr>
@@ -8815,7 +8815,7 @@
 </file>
 
 <file path=ppt/slideLayouts/slideLayout3.xml><?xml version="1.0" encoding="utf-8"?>
-<p:sldLayout xmlns:a="http://schemas.openxmlformats.org/drawingml/2006/main" xmlns:r="http://schemas.openxmlformats.org/officeDocument/2006/relationships" xmlns:mc="http://schemas.openxmlformats.org/markup-compatibility/2006" xmlns:mv="urn:schemas-microsoft-com:mac:vml" xmlns:p="http://schemas.openxmlformats.org/presentationml/2006/main" xmlns:c="http://schemas.openxmlformats.org/drawingml/2006/chart" xmlns:dgm="http://schemas.openxmlformats.org/drawingml/2006/diagram" xmlns:o="urn:schemas-microsoft-com:office:office" xmlns:v="urn:schemas-microsoft-com:vml" xmlns:pvml="urn:schemas-microsoft-com:office:powerpoint" xmlns:com="http://schemas.openxmlformats.org/drawingml/2006/compatibility" xmlns:p14="http://schemas.microsoft.com/office/powerpoint/2010/main" xmlns:p15="http://schemas.microsoft.com/office/powerpoint/2012/main" matchingName="Section Header" type="secHead">
+<p:sldLayout xmlns:a="http://schemas.openxmlformats.org/drawingml/2006/main" xmlns:r="http://schemas.openxmlformats.org/officeDocument/2006/relationships" xmlns:mc="http://schemas.openxmlformats.org/markup-compatibility/2006" xmlns:mv="urn:schemas-microsoft-com:mac:vml" xmlns:p="http://schemas.openxmlformats.org/presentationml/2006/main" xmlns:c="http://schemas.openxmlformats.org/drawingml/2006/chart" xmlns:dgm="http://schemas.openxmlformats.org/drawingml/2006/diagram" xmlns:o="urn:schemas-microsoft-com:office:office" xmlns:v="urn:schemas-microsoft-com:vml" xmlns:pvml="urn:schemas-microsoft-com:office:powerpoint" xmlns:com="http://schemas.openxmlformats.org/drawingml/2006/compatibility" xmlns:p14="http://schemas.microsoft.com/office/powerpoint/2010/main" xmlns:p15="http://schemas.microsoft.com/office/powerpoint/2012/main" xmlns:ahyp="http://schemas.microsoft.com/office/drawing/2018/hyperlinkcolor" matchingName="Section Header" type="secHead">
   <p:cSld name="SECTION_HEADER">
     <p:spTree>
       <p:nvGrpSpPr>
@@ -9747,7 +9747,7 @@
 </file>
 
 <file path=ppt/slideLayouts/slideLayout4.xml><?xml version="1.0" encoding="utf-8"?>
-<p:sldLayout xmlns:a="http://schemas.openxmlformats.org/drawingml/2006/main" xmlns:r="http://schemas.openxmlformats.org/officeDocument/2006/relationships" xmlns:mc="http://schemas.openxmlformats.org/markup-compatibility/2006" xmlns:mv="urn:schemas-microsoft-com:mac:vml" xmlns:p="http://schemas.openxmlformats.org/presentationml/2006/main" xmlns:c="http://schemas.openxmlformats.org/drawingml/2006/chart" xmlns:dgm="http://schemas.openxmlformats.org/drawingml/2006/diagram" xmlns:o="urn:schemas-microsoft-com:office:office" xmlns:v="urn:schemas-microsoft-com:vml" xmlns:pvml="urn:schemas-microsoft-com:office:powerpoint" xmlns:com="http://schemas.openxmlformats.org/drawingml/2006/compatibility" xmlns:p14="http://schemas.microsoft.com/office/powerpoint/2010/main" xmlns:p15="http://schemas.microsoft.com/office/powerpoint/2012/main" matchingName="Title Only" type="titleOnly">
+<p:sldLayout xmlns:a="http://schemas.openxmlformats.org/drawingml/2006/main" xmlns:r="http://schemas.openxmlformats.org/officeDocument/2006/relationships" xmlns:mc="http://schemas.openxmlformats.org/markup-compatibility/2006" xmlns:mv="urn:schemas-microsoft-com:mac:vml" xmlns:p="http://schemas.openxmlformats.org/presentationml/2006/main" xmlns:c="http://schemas.openxmlformats.org/drawingml/2006/chart" xmlns:dgm="http://schemas.openxmlformats.org/drawingml/2006/diagram" xmlns:o="urn:schemas-microsoft-com:office:office" xmlns:v="urn:schemas-microsoft-com:vml" xmlns:pvml="urn:schemas-microsoft-com:office:powerpoint" xmlns:com="http://schemas.openxmlformats.org/drawingml/2006/compatibility" xmlns:p14="http://schemas.microsoft.com/office/powerpoint/2010/main" xmlns:p15="http://schemas.microsoft.com/office/powerpoint/2012/main" xmlns:ahyp="http://schemas.microsoft.com/office/drawing/2018/hyperlinkcolor" matchingName="Title Only" type="titleOnly">
   <p:cSld name="TITLE_ONLY">
     <p:spTree>
       <p:nvGrpSpPr>
@@ -10486,7 +10486,7 @@
 </file>
 
 <file path=ppt/slideLayouts/slideLayout5.xml><?xml version="1.0" encoding="utf-8"?>
-<p:sldLayout xmlns:a="http://schemas.openxmlformats.org/drawingml/2006/main" xmlns:r="http://schemas.openxmlformats.org/officeDocument/2006/relationships" xmlns:mc="http://schemas.openxmlformats.org/markup-compatibility/2006" xmlns:mv="urn:schemas-microsoft-com:mac:vml" xmlns:p="http://schemas.openxmlformats.org/presentationml/2006/main" xmlns:c="http://schemas.openxmlformats.org/drawingml/2006/chart" xmlns:dgm="http://schemas.openxmlformats.org/drawingml/2006/diagram" xmlns:o="urn:schemas-microsoft-com:office:office" xmlns:v="urn:schemas-microsoft-com:vml" xmlns:pvml="urn:schemas-microsoft-com:office:powerpoint" xmlns:com="http://schemas.openxmlformats.org/drawingml/2006/compatibility" xmlns:p14="http://schemas.microsoft.com/office/powerpoint/2010/main" xmlns:p15="http://schemas.microsoft.com/office/powerpoint/2012/main" matchingName="Title and Body" type="tx">
+<p:sldLayout xmlns:a="http://schemas.openxmlformats.org/drawingml/2006/main" xmlns:r="http://schemas.openxmlformats.org/officeDocument/2006/relationships" xmlns:mc="http://schemas.openxmlformats.org/markup-compatibility/2006" xmlns:mv="urn:schemas-microsoft-com:mac:vml" xmlns:p="http://schemas.openxmlformats.org/presentationml/2006/main" xmlns:c="http://schemas.openxmlformats.org/drawingml/2006/chart" xmlns:dgm="http://schemas.openxmlformats.org/drawingml/2006/diagram" xmlns:o="urn:schemas-microsoft-com:office:office" xmlns:v="urn:schemas-microsoft-com:vml" xmlns:pvml="urn:schemas-microsoft-com:office:powerpoint" xmlns:com="http://schemas.openxmlformats.org/drawingml/2006/compatibility" xmlns:p14="http://schemas.microsoft.com/office/powerpoint/2010/main" xmlns:p15="http://schemas.microsoft.com/office/powerpoint/2012/main" xmlns:ahyp="http://schemas.microsoft.com/office/drawing/2018/hyperlinkcolor" matchingName="Title and Body" type="tx">
   <p:cSld name="TITLE_AND_BODY">
     <p:spTree>
       <p:nvGrpSpPr>
@@ -10800,7 +10800,7 @@
 </file>
 
 <file path=ppt/slideLayouts/slideLayout6.xml><?xml version="1.0" encoding="utf-8"?>
-<p:sldLayout xmlns:a="http://schemas.openxmlformats.org/drawingml/2006/main" xmlns:r="http://schemas.openxmlformats.org/officeDocument/2006/relationships" xmlns:mc="http://schemas.openxmlformats.org/markup-compatibility/2006" xmlns:mv="urn:schemas-microsoft-com:mac:vml" xmlns:p="http://schemas.openxmlformats.org/presentationml/2006/main" xmlns:c="http://schemas.openxmlformats.org/drawingml/2006/chart" xmlns:dgm="http://schemas.openxmlformats.org/drawingml/2006/diagram" xmlns:o="urn:schemas-microsoft-com:office:office" xmlns:v="urn:schemas-microsoft-com:vml" xmlns:pvml="urn:schemas-microsoft-com:office:powerpoint" xmlns:com="http://schemas.openxmlformats.org/drawingml/2006/compatibility" xmlns:p14="http://schemas.microsoft.com/office/powerpoint/2010/main" xmlns:p15="http://schemas.microsoft.com/office/powerpoint/2012/main" matchingName="Two Content" type="twoObj">
+<p:sldLayout xmlns:a="http://schemas.openxmlformats.org/drawingml/2006/main" xmlns:r="http://schemas.openxmlformats.org/officeDocument/2006/relationships" xmlns:mc="http://schemas.openxmlformats.org/markup-compatibility/2006" xmlns:mv="urn:schemas-microsoft-com:mac:vml" xmlns:p="http://schemas.openxmlformats.org/presentationml/2006/main" xmlns:c="http://schemas.openxmlformats.org/drawingml/2006/chart" xmlns:dgm="http://schemas.openxmlformats.org/drawingml/2006/diagram" xmlns:o="urn:schemas-microsoft-com:office:office" xmlns:v="urn:schemas-microsoft-com:vml" xmlns:pvml="urn:schemas-microsoft-com:office:powerpoint" xmlns:com="http://schemas.openxmlformats.org/drawingml/2006/compatibility" xmlns:p14="http://schemas.microsoft.com/office/powerpoint/2010/main" xmlns:p15="http://schemas.microsoft.com/office/powerpoint/2012/main" xmlns:ahyp="http://schemas.microsoft.com/office/drawing/2018/hyperlinkcolor" matchingName="Two Content" type="twoObj">
   <p:cSld name="TWO_OBJECTS">
     <p:spTree>
       <p:nvGrpSpPr>
@@ -11851,7 +11851,7 @@
 </file>
 
 <file path=ppt/slideLayouts/slideLayout7.xml><?xml version="1.0" encoding="utf-8"?>
-<p:sldLayout xmlns:a="http://schemas.openxmlformats.org/drawingml/2006/main" xmlns:r="http://schemas.openxmlformats.org/officeDocument/2006/relationships" xmlns:mc="http://schemas.openxmlformats.org/markup-compatibility/2006" xmlns:mv="urn:schemas-microsoft-com:mac:vml" xmlns:p="http://schemas.openxmlformats.org/presentationml/2006/main" xmlns:c="http://schemas.openxmlformats.org/drawingml/2006/chart" xmlns:dgm="http://schemas.openxmlformats.org/drawingml/2006/diagram" xmlns:o="urn:schemas-microsoft-com:office:office" xmlns:v="urn:schemas-microsoft-com:vml" xmlns:pvml="urn:schemas-microsoft-com:office:powerpoint" xmlns:com="http://schemas.openxmlformats.org/drawingml/2006/compatibility" xmlns:p14="http://schemas.microsoft.com/office/powerpoint/2010/main" xmlns:p15="http://schemas.microsoft.com/office/powerpoint/2012/main" matchingName="Comparison" type="twoTxTwoObj">
+<p:sldLayout xmlns:a="http://schemas.openxmlformats.org/drawingml/2006/main" xmlns:r="http://schemas.openxmlformats.org/officeDocument/2006/relationships" xmlns:mc="http://schemas.openxmlformats.org/markup-compatibility/2006" xmlns:mv="urn:schemas-microsoft-com:mac:vml" xmlns:p="http://schemas.openxmlformats.org/presentationml/2006/main" xmlns:c="http://schemas.openxmlformats.org/drawingml/2006/chart" xmlns:dgm="http://schemas.openxmlformats.org/drawingml/2006/diagram" xmlns:o="urn:schemas-microsoft-com:office:office" xmlns:v="urn:schemas-microsoft-com:vml" xmlns:pvml="urn:schemas-microsoft-com:office:powerpoint" xmlns:com="http://schemas.openxmlformats.org/drawingml/2006/compatibility" xmlns:p14="http://schemas.microsoft.com/office/powerpoint/2010/main" xmlns:p15="http://schemas.microsoft.com/office/powerpoint/2012/main" xmlns:ahyp="http://schemas.microsoft.com/office/drawing/2018/hyperlinkcolor" matchingName="Comparison" type="twoTxTwoObj">
   <p:cSld name="TWO_OBJECTS_WITH_TEXT">
     <p:spTree>
       <p:nvGrpSpPr>
@@ -13215,7 +13215,7 @@
 </file>
 
 <file path=ppt/slideLayouts/slideLayout8.xml><?xml version="1.0" encoding="utf-8"?>
-<p:sldLayout xmlns:a="http://schemas.openxmlformats.org/drawingml/2006/main" xmlns:r="http://schemas.openxmlformats.org/officeDocument/2006/relationships" xmlns:mc="http://schemas.openxmlformats.org/markup-compatibility/2006" xmlns:mv="urn:schemas-microsoft-com:mac:vml" xmlns:p="http://schemas.openxmlformats.org/presentationml/2006/main" xmlns:c="http://schemas.openxmlformats.org/drawingml/2006/chart" xmlns:dgm="http://schemas.openxmlformats.org/drawingml/2006/diagram" xmlns:o="urn:schemas-microsoft-com:office:office" xmlns:v="urn:schemas-microsoft-com:vml" xmlns:pvml="urn:schemas-microsoft-com:office:powerpoint" xmlns:com="http://schemas.openxmlformats.org/drawingml/2006/compatibility" xmlns:p14="http://schemas.microsoft.com/office/powerpoint/2010/main" xmlns:p15="http://schemas.microsoft.com/office/powerpoint/2012/main" matchingName="Blank" type="blank">
+<p:sldLayout xmlns:a="http://schemas.openxmlformats.org/drawingml/2006/main" xmlns:r="http://schemas.openxmlformats.org/officeDocument/2006/relationships" xmlns:mc="http://schemas.openxmlformats.org/markup-compatibility/2006" xmlns:mv="urn:schemas-microsoft-com:mac:vml" xmlns:p="http://schemas.openxmlformats.org/presentationml/2006/main" xmlns:c="http://schemas.openxmlformats.org/drawingml/2006/chart" xmlns:dgm="http://schemas.openxmlformats.org/drawingml/2006/diagram" xmlns:o="urn:schemas-microsoft-com:office:office" xmlns:v="urn:schemas-microsoft-com:vml" xmlns:pvml="urn:schemas-microsoft-com:office:powerpoint" xmlns:com="http://schemas.openxmlformats.org/drawingml/2006/compatibility" xmlns:p14="http://schemas.microsoft.com/office/powerpoint/2010/main" xmlns:p15="http://schemas.microsoft.com/office/powerpoint/2012/main" xmlns:ahyp="http://schemas.microsoft.com/office/drawing/2018/hyperlinkcolor" matchingName="Blank" type="blank">
   <p:cSld name="BLANK">
     <p:spTree>
       <p:nvGrpSpPr>
@@ -13822,7 +13822,7 @@
 </file>
 
 <file path=ppt/slideLayouts/slideLayout9.xml><?xml version="1.0" encoding="utf-8"?>
-<p:sldLayout xmlns:a="http://schemas.openxmlformats.org/drawingml/2006/main" xmlns:r="http://schemas.openxmlformats.org/officeDocument/2006/relationships" xmlns:mc="http://schemas.openxmlformats.org/markup-compatibility/2006" xmlns:mv="urn:schemas-microsoft-com:mac:vml" xmlns:p="http://schemas.openxmlformats.org/presentationml/2006/main" xmlns:c="http://schemas.openxmlformats.org/drawingml/2006/chart" xmlns:dgm="http://schemas.openxmlformats.org/drawingml/2006/diagram" xmlns:o="urn:schemas-microsoft-com:office:office" xmlns:v="urn:schemas-microsoft-com:vml" xmlns:pvml="urn:schemas-microsoft-com:office:powerpoint" xmlns:com="http://schemas.openxmlformats.org/drawingml/2006/compatibility" xmlns:p14="http://schemas.microsoft.com/office/powerpoint/2010/main" xmlns:p15="http://schemas.microsoft.com/office/powerpoint/2012/main" matchingName="Content with Caption" type="objTx">
+<p:sldLayout xmlns:a="http://schemas.openxmlformats.org/drawingml/2006/main" xmlns:r="http://schemas.openxmlformats.org/officeDocument/2006/relationships" xmlns:mc="http://schemas.openxmlformats.org/markup-compatibility/2006" xmlns:mv="urn:schemas-microsoft-com:mac:vml" xmlns:p="http://schemas.openxmlformats.org/presentationml/2006/main" xmlns:c="http://schemas.openxmlformats.org/drawingml/2006/chart" xmlns:dgm="http://schemas.openxmlformats.org/drawingml/2006/diagram" xmlns:o="urn:schemas-microsoft-com:office:office" xmlns:v="urn:schemas-microsoft-com:vml" xmlns:pvml="urn:schemas-microsoft-com:office:powerpoint" xmlns:com="http://schemas.openxmlformats.org/drawingml/2006/compatibility" xmlns:p14="http://schemas.microsoft.com/office/powerpoint/2010/main" xmlns:p15="http://schemas.microsoft.com/office/powerpoint/2012/main" xmlns:ahyp="http://schemas.microsoft.com/office/drawing/2018/hyperlinkcolor" matchingName="Content with Caption" type="objTx">
   <p:cSld name="OBJECT_WITH_CAPTION_TEXT">
     <p:spTree>
       <p:nvGrpSpPr>
@@ -14874,7 +14874,7 @@
 </file>
 
 <file path=ppt/slideMasters/slideMaster1.xml><?xml version="1.0" encoding="utf-8"?>
-<p:sldMaster xmlns:a="http://schemas.openxmlformats.org/drawingml/2006/main" xmlns:r="http://schemas.openxmlformats.org/officeDocument/2006/relationships" xmlns:mc="http://schemas.openxmlformats.org/markup-compatibility/2006" xmlns:mv="urn:schemas-microsoft-com:mac:vml" xmlns:p="http://schemas.openxmlformats.org/presentationml/2006/main" xmlns:c="http://schemas.openxmlformats.org/drawingml/2006/chart" xmlns:dgm="http://schemas.openxmlformats.org/drawingml/2006/diagram" xmlns:o="urn:schemas-microsoft-com:office:office" xmlns:v="urn:schemas-microsoft-com:vml" xmlns:pvml="urn:schemas-microsoft-com:office:powerpoint" xmlns:com="http://schemas.openxmlformats.org/drawingml/2006/compatibility" xmlns:p14="http://schemas.microsoft.com/office/powerpoint/2010/main" xmlns:p15="http://schemas.microsoft.com/office/powerpoint/2012/main">
+<p:sldMaster xmlns:a="http://schemas.openxmlformats.org/drawingml/2006/main" xmlns:r="http://schemas.openxmlformats.org/officeDocument/2006/relationships" xmlns:mc="http://schemas.openxmlformats.org/markup-compatibility/2006" xmlns:mv="urn:schemas-microsoft-com:mac:vml" xmlns:p="http://schemas.openxmlformats.org/presentationml/2006/main" xmlns:c="http://schemas.openxmlformats.org/drawingml/2006/chart" xmlns:dgm="http://schemas.openxmlformats.org/drawingml/2006/diagram" xmlns:o="urn:schemas-microsoft-com:office:office" xmlns:v="urn:schemas-microsoft-com:vml" xmlns:pvml="urn:schemas-microsoft-com:office:powerpoint" xmlns:com="http://schemas.openxmlformats.org/drawingml/2006/compatibility" xmlns:p14="http://schemas.microsoft.com/office/powerpoint/2010/main" xmlns:p15="http://schemas.microsoft.com/office/powerpoint/2012/main" xmlns:ahyp="http://schemas.microsoft.com/office/drawing/2018/hyperlinkcolor">
   <p:cSld>
     <p:bg>
       <p:bgPr>
@@ -15377,7 +15377,13 @@
                 <a:ea typeface="Montserrat"/>
                 <a:cs typeface="Montserrat"/>
                 <a:sym typeface="Montserrat"/>
-                <a:hlinkClick r:id="rId1"/>
+                <a:hlinkClick r:id="rId1">
+                  <a:extLst>
+                    <a:ext uri="{A12FA001-AC4F-418D-AE19-62706E023703}">
+                      <ahyp:hlinkClr val="tx"/>
+                    </a:ext>
+                  </a:extLst>
+                </a:hlinkClick>
               </a:rPr>
               <a:t>http://creativecommons.org/licenses/by-nc-sa/4.0/</a:t>
             </a:r>
@@ -16135,7 +16141,7 @@
 </file>
 
 <file path=ppt/slides/slide1.xml><?xml version="1.0" encoding="utf-8"?>
-<p:sld xmlns:a="http://schemas.openxmlformats.org/drawingml/2006/main" xmlns:r="http://schemas.openxmlformats.org/officeDocument/2006/relationships" xmlns:mc="http://schemas.openxmlformats.org/markup-compatibility/2006" xmlns:mv="urn:schemas-microsoft-com:mac:vml" xmlns:p="http://schemas.openxmlformats.org/presentationml/2006/main" xmlns:c="http://schemas.openxmlformats.org/drawingml/2006/chart" xmlns:dgm="http://schemas.openxmlformats.org/drawingml/2006/diagram" xmlns:o="urn:schemas-microsoft-com:office:office" xmlns:v="urn:schemas-microsoft-com:vml" xmlns:pvml="urn:schemas-microsoft-com:office:powerpoint" xmlns:com="http://schemas.openxmlformats.org/drawingml/2006/compatibility" xmlns:p14="http://schemas.microsoft.com/office/powerpoint/2010/main" xmlns:p15="http://schemas.microsoft.com/office/powerpoint/2012/main">
+<p:sld xmlns:a="http://schemas.openxmlformats.org/drawingml/2006/main" xmlns:r="http://schemas.openxmlformats.org/officeDocument/2006/relationships" xmlns:mc="http://schemas.openxmlformats.org/markup-compatibility/2006" xmlns:mv="urn:schemas-microsoft-com:mac:vml" xmlns:p="http://schemas.openxmlformats.org/presentationml/2006/main" xmlns:c="http://schemas.openxmlformats.org/drawingml/2006/chart" xmlns:dgm="http://schemas.openxmlformats.org/drawingml/2006/diagram" xmlns:o="urn:schemas-microsoft-com:office:office" xmlns:v="urn:schemas-microsoft-com:vml" xmlns:pvml="urn:schemas-microsoft-com:office:powerpoint" xmlns:com="http://schemas.openxmlformats.org/drawingml/2006/compatibility" xmlns:p14="http://schemas.microsoft.com/office/powerpoint/2010/main" xmlns:p15="http://schemas.microsoft.com/office/powerpoint/2012/main" xmlns:ahyp="http://schemas.microsoft.com/office/drawing/2018/hyperlinkcolor">
   <p:cSld>
     <p:spTree>
       <p:nvGrpSpPr>
@@ -16319,7 +16325,7 @@
 </file>
 
 <file path=ppt/slides/slide10.xml><?xml version="1.0" encoding="utf-8"?>
-<p:sld xmlns:a="http://schemas.openxmlformats.org/drawingml/2006/main" xmlns:r="http://schemas.openxmlformats.org/officeDocument/2006/relationships" xmlns:mc="http://schemas.openxmlformats.org/markup-compatibility/2006" xmlns:mv="urn:schemas-microsoft-com:mac:vml" xmlns:p="http://schemas.openxmlformats.org/presentationml/2006/main" xmlns:c="http://schemas.openxmlformats.org/drawingml/2006/chart" xmlns:dgm="http://schemas.openxmlformats.org/drawingml/2006/diagram" xmlns:o="urn:schemas-microsoft-com:office:office" xmlns:v="urn:schemas-microsoft-com:vml" xmlns:pvml="urn:schemas-microsoft-com:office:powerpoint" xmlns:com="http://schemas.openxmlformats.org/drawingml/2006/compatibility" xmlns:p14="http://schemas.microsoft.com/office/powerpoint/2010/main" xmlns:p15="http://schemas.microsoft.com/office/powerpoint/2012/main">
+<p:sld xmlns:a="http://schemas.openxmlformats.org/drawingml/2006/main" xmlns:r="http://schemas.openxmlformats.org/officeDocument/2006/relationships" xmlns:mc="http://schemas.openxmlformats.org/markup-compatibility/2006" xmlns:mv="urn:schemas-microsoft-com:mac:vml" xmlns:p="http://schemas.openxmlformats.org/presentationml/2006/main" xmlns:c="http://schemas.openxmlformats.org/drawingml/2006/chart" xmlns:dgm="http://schemas.openxmlformats.org/drawingml/2006/diagram" xmlns:o="urn:schemas-microsoft-com:office:office" xmlns:v="urn:schemas-microsoft-com:vml" xmlns:pvml="urn:schemas-microsoft-com:office:powerpoint" xmlns:com="http://schemas.openxmlformats.org/drawingml/2006/compatibility" xmlns:p14="http://schemas.microsoft.com/office/powerpoint/2010/main" xmlns:p15="http://schemas.microsoft.com/office/powerpoint/2012/main" xmlns:ahyp="http://schemas.microsoft.com/office/drawing/2018/hyperlinkcolor">
   <p:cSld>
     <p:spTree>
       <p:nvGrpSpPr>
@@ -16419,7 +16425,7 @@
 </file>
 
 <file path=ppt/slides/slide11.xml><?xml version="1.0" encoding="utf-8"?>
-<p:sld xmlns:a="http://schemas.openxmlformats.org/drawingml/2006/main" xmlns:r="http://schemas.openxmlformats.org/officeDocument/2006/relationships" xmlns:mc="http://schemas.openxmlformats.org/markup-compatibility/2006" xmlns:mv="urn:schemas-microsoft-com:mac:vml" xmlns:p="http://schemas.openxmlformats.org/presentationml/2006/main" xmlns:c="http://schemas.openxmlformats.org/drawingml/2006/chart" xmlns:dgm="http://schemas.openxmlformats.org/drawingml/2006/diagram" xmlns:o="urn:schemas-microsoft-com:office:office" xmlns:v="urn:schemas-microsoft-com:vml" xmlns:pvml="urn:schemas-microsoft-com:office:powerpoint" xmlns:com="http://schemas.openxmlformats.org/drawingml/2006/compatibility" xmlns:p14="http://schemas.microsoft.com/office/powerpoint/2010/main" xmlns:p15="http://schemas.microsoft.com/office/powerpoint/2012/main">
+<p:sld xmlns:a="http://schemas.openxmlformats.org/drawingml/2006/main" xmlns:r="http://schemas.openxmlformats.org/officeDocument/2006/relationships" xmlns:mc="http://schemas.openxmlformats.org/markup-compatibility/2006" xmlns:mv="urn:schemas-microsoft-com:mac:vml" xmlns:p="http://schemas.openxmlformats.org/presentationml/2006/main" xmlns:c="http://schemas.openxmlformats.org/drawingml/2006/chart" xmlns:dgm="http://schemas.openxmlformats.org/drawingml/2006/diagram" xmlns:o="urn:schemas-microsoft-com:office:office" xmlns:v="urn:schemas-microsoft-com:vml" xmlns:pvml="urn:schemas-microsoft-com:office:powerpoint" xmlns:com="http://schemas.openxmlformats.org/drawingml/2006/compatibility" xmlns:p14="http://schemas.microsoft.com/office/powerpoint/2010/main" xmlns:p15="http://schemas.microsoft.com/office/powerpoint/2012/main" xmlns:ahyp="http://schemas.microsoft.com/office/drawing/2018/hyperlinkcolor">
   <p:cSld>
     <p:spTree>
       <p:nvGrpSpPr>
@@ -16963,7 +16969,7 @@
 </file>
 
 <file path=ppt/slides/slide12.xml><?xml version="1.0" encoding="utf-8"?>
-<p:sld xmlns:a="http://schemas.openxmlformats.org/drawingml/2006/main" xmlns:r="http://schemas.openxmlformats.org/officeDocument/2006/relationships" xmlns:mc="http://schemas.openxmlformats.org/markup-compatibility/2006" xmlns:mv="urn:schemas-microsoft-com:mac:vml" xmlns:p="http://schemas.openxmlformats.org/presentationml/2006/main" xmlns:c="http://schemas.openxmlformats.org/drawingml/2006/chart" xmlns:dgm="http://schemas.openxmlformats.org/drawingml/2006/diagram" xmlns:o="urn:schemas-microsoft-com:office:office" xmlns:v="urn:schemas-microsoft-com:vml" xmlns:pvml="urn:schemas-microsoft-com:office:powerpoint" xmlns:com="http://schemas.openxmlformats.org/drawingml/2006/compatibility" xmlns:p14="http://schemas.microsoft.com/office/powerpoint/2010/main" xmlns:p15="http://schemas.microsoft.com/office/powerpoint/2012/main">
+<p:sld xmlns:a="http://schemas.openxmlformats.org/drawingml/2006/main" xmlns:r="http://schemas.openxmlformats.org/officeDocument/2006/relationships" xmlns:mc="http://schemas.openxmlformats.org/markup-compatibility/2006" xmlns:mv="urn:schemas-microsoft-com:mac:vml" xmlns:p="http://schemas.openxmlformats.org/presentationml/2006/main" xmlns:c="http://schemas.openxmlformats.org/drawingml/2006/chart" xmlns:dgm="http://schemas.openxmlformats.org/drawingml/2006/diagram" xmlns:o="urn:schemas-microsoft-com:office:office" xmlns:v="urn:schemas-microsoft-com:vml" xmlns:pvml="urn:schemas-microsoft-com:office:powerpoint" xmlns:com="http://schemas.openxmlformats.org/drawingml/2006/compatibility" xmlns:p14="http://schemas.microsoft.com/office/powerpoint/2010/main" xmlns:p15="http://schemas.microsoft.com/office/powerpoint/2012/main" xmlns:ahyp="http://schemas.microsoft.com/office/drawing/2018/hyperlinkcolor">
   <p:cSld>
     <p:spTree>
       <p:nvGrpSpPr>
@@ -17885,7 +17891,7 @@
 </file>
 
 <file path=ppt/slides/slide13.xml><?xml version="1.0" encoding="utf-8"?>
-<p:sld xmlns:a="http://schemas.openxmlformats.org/drawingml/2006/main" xmlns:r="http://schemas.openxmlformats.org/officeDocument/2006/relationships" xmlns:mc="http://schemas.openxmlformats.org/markup-compatibility/2006" xmlns:mv="urn:schemas-microsoft-com:mac:vml" xmlns:p="http://schemas.openxmlformats.org/presentationml/2006/main" xmlns:c="http://schemas.openxmlformats.org/drawingml/2006/chart" xmlns:dgm="http://schemas.openxmlformats.org/drawingml/2006/diagram" xmlns:o="urn:schemas-microsoft-com:office:office" xmlns:v="urn:schemas-microsoft-com:vml" xmlns:pvml="urn:schemas-microsoft-com:office:powerpoint" xmlns:com="http://schemas.openxmlformats.org/drawingml/2006/compatibility" xmlns:p14="http://schemas.microsoft.com/office/powerpoint/2010/main" xmlns:p15="http://schemas.microsoft.com/office/powerpoint/2012/main">
+<p:sld xmlns:a="http://schemas.openxmlformats.org/drawingml/2006/main" xmlns:r="http://schemas.openxmlformats.org/officeDocument/2006/relationships" xmlns:mc="http://schemas.openxmlformats.org/markup-compatibility/2006" xmlns:mv="urn:schemas-microsoft-com:mac:vml" xmlns:p="http://schemas.openxmlformats.org/presentationml/2006/main" xmlns:c="http://schemas.openxmlformats.org/drawingml/2006/chart" xmlns:dgm="http://schemas.openxmlformats.org/drawingml/2006/diagram" xmlns:o="urn:schemas-microsoft-com:office:office" xmlns:v="urn:schemas-microsoft-com:vml" xmlns:pvml="urn:schemas-microsoft-com:office:powerpoint" xmlns:com="http://schemas.openxmlformats.org/drawingml/2006/compatibility" xmlns:p14="http://schemas.microsoft.com/office/powerpoint/2010/main" xmlns:p15="http://schemas.microsoft.com/office/powerpoint/2012/main" xmlns:ahyp="http://schemas.microsoft.com/office/drawing/2018/hyperlinkcolor">
   <p:cSld>
     <p:spTree>
       <p:nvGrpSpPr>
@@ -18006,7 +18012,7 @@
 </file>
 
 <file path=ppt/slides/slide14.xml><?xml version="1.0" encoding="utf-8"?>
-<p:sld xmlns:a="http://schemas.openxmlformats.org/drawingml/2006/main" xmlns:r="http://schemas.openxmlformats.org/officeDocument/2006/relationships" xmlns:mc="http://schemas.openxmlformats.org/markup-compatibility/2006" xmlns:mv="urn:schemas-microsoft-com:mac:vml" xmlns:p="http://schemas.openxmlformats.org/presentationml/2006/main" xmlns:c="http://schemas.openxmlformats.org/drawingml/2006/chart" xmlns:dgm="http://schemas.openxmlformats.org/drawingml/2006/diagram" xmlns:o="urn:schemas-microsoft-com:office:office" xmlns:v="urn:schemas-microsoft-com:vml" xmlns:pvml="urn:schemas-microsoft-com:office:powerpoint" xmlns:com="http://schemas.openxmlformats.org/drawingml/2006/compatibility" xmlns:p14="http://schemas.microsoft.com/office/powerpoint/2010/main" xmlns:p15="http://schemas.microsoft.com/office/powerpoint/2012/main">
+<p:sld xmlns:a="http://schemas.openxmlformats.org/drawingml/2006/main" xmlns:r="http://schemas.openxmlformats.org/officeDocument/2006/relationships" xmlns:mc="http://schemas.openxmlformats.org/markup-compatibility/2006" xmlns:mv="urn:schemas-microsoft-com:mac:vml" xmlns:p="http://schemas.openxmlformats.org/presentationml/2006/main" xmlns:c="http://schemas.openxmlformats.org/drawingml/2006/chart" xmlns:dgm="http://schemas.openxmlformats.org/drawingml/2006/diagram" xmlns:o="urn:schemas-microsoft-com:office:office" xmlns:v="urn:schemas-microsoft-com:vml" xmlns:pvml="urn:schemas-microsoft-com:office:powerpoint" xmlns:com="http://schemas.openxmlformats.org/drawingml/2006/compatibility" xmlns:p14="http://schemas.microsoft.com/office/powerpoint/2010/main" xmlns:p15="http://schemas.microsoft.com/office/powerpoint/2012/main" xmlns:ahyp="http://schemas.microsoft.com/office/drawing/2018/hyperlinkcolor">
   <p:cSld>
     <p:spTree>
       <p:nvGrpSpPr>
@@ -18058,7 +18064,7 @@
 </file>
 
 <file path=ppt/slides/slide15.xml><?xml version="1.0" encoding="utf-8"?>
-<p:sld xmlns:a="http://schemas.openxmlformats.org/drawingml/2006/main" xmlns:r="http://schemas.openxmlformats.org/officeDocument/2006/relationships" xmlns:mc="http://schemas.openxmlformats.org/markup-compatibility/2006" xmlns:mv="urn:schemas-microsoft-com:mac:vml" xmlns:p="http://schemas.openxmlformats.org/presentationml/2006/main" xmlns:c="http://schemas.openxmlformats.org/drawingml/2006/chart" xmlns:dgm="http://schemas.openxmlformats.org/drawingml/2006/diagram" xmlns:o="urn:schemas-microsoft-com:office:office" xmlns:v="urn:schemas-microsoft-com:vml" xmlns:pvml="urn:schemas-microsoft-com:office:powerpoint" xmlns:com="http://schemas.openxmlformats.org/drawingml/2006/compatibility" xmlns:p14="http://schemas.microsoft.com/office/powerpoint/2010/main" xmlns:p15="http://schemas.microsoft.com/office/powerpoint/2012/main">
+<p:sld xmlns:a="http://schemas.openxmlformats.org/drawingml/2006/main" xmlns:r="http://schemas.openxmlformats.org/officeDocument/2006/relationships" xmlns:mc="http://schemas.openxmlformats.org/markup-compatibility/2006" xmlns:mv="urn:schemas-microsoft-com:mac:vml" xmlns:p="http://schemas.openxmlformats.org/presentationml/2006/main" xmlns:c="http://schemas.openxmlformats.org/drawingml/2006/chart" xmlns:dgm="http://schemas.openxmlformats.org/drawingml/2006/diagram" xmlns:o="urn:schemas-microsoft-com:office:office" xmlns:v="urn:schemas-microsoft-com:vml" xmlns:pvml="urn:schemas-microsoft-com:office:powerpoint" xmlns:com="http://schemas.openxmlformats.org/drawingml/2006/compatibility" xmlns:p14="http://schemas.microsoft.com/office/powerpoint/2010/main" xmlns:p15="http://schemas.microsoft.com/office/powerpoint/2012/main" xmlns:ahyp="http://schemas.microsoft.com/office/drawing/2018/hyperlinkcolor">
   <p:cSld>
     <p:spTree>
       <p:nvGrpSpPr>
@@ -18288,7 +18294,7 @@
 </file>
 
 <file path=ppt/slides/slide16.xml><?xml version="1.0" encoding="utf-8"?>
-<p:sld xmlns:a="http://schemas.openxmlformats.org/drawingml/2006/main" xmlns:r="http://schemas.openxmlformats.org/officeDocument/2006/relationships" xmlns:mc="http://schemas.openxmlformats.org/markup-compatibility/2006" xmlns:mv="urn:schemas-microsoft-com:mac:vml" xmlns:p="http://schemas.openxmlformats.org/presentationml/2006/main" xmlns:c="http://schemas.openxmlformats.org/drawingml/2006/chart" xmlns:dgm="http://schemas.openxmlformats.org/drawingml/2006/diagram" xmlns:o="urn:schemas-microsoft-com:office:office" xmlns:v="urn:schemas-microsoft-com:vml" xmlns:pvml="urn:schemas-microsoft-com:office:powerpoint" xmlns:com="http://schemas.openxmlformats.org/drawingml/2006/compatibility" xmlns:p14="http://schemas.microsoft.com/office/powerpoint/2010/main" xmlns:p15="http://schemas.microsoft.com/office/powerpoint/2012/main">
+<p:sld xmlns:a="http://schemas.openxmlformats.org/drawingml/2006/main" xmlns:r="http://schemas.openxmlformats.org/officeDocument/2006/relationships" xmlns:mc="http://schemas.openxmlformats.org/markup-compatibility/2006" xmlns:mv="urn:schemas-microsoft-com:mac:vml" xmlns:p="http://schemas.openxmlformats.org/presentationml/2006/main" xmlns:c="http://schemas.openxmlformats.org/drawingml/2006/chart" xmlns:dgm="http://schemas.openxmlformats.org/drawingml/2006/diagram" xmlns:o="urn:schemas-microsoft-com:office:office" xmlns:v="urn:schemas-microsoft-com:vml" xmlns:pvml="urn:schemas-microsoft-com:office:powerpoint" xmlns:com="http://schemas.openxmlformats.org/drawingml/2006/compatibility" xmlns:p14="http://schemas.microsoft.com/office/powerpoint/2010/main" xmlns:p15="http://schemas.microsoft.com/office/powerpoint/2012/main" xmlns:ahyp="http://schemas.microsoft.com/office/drawing/2018/hyperlinkcolor">
   <p:cSld>
     <p:spTree>
       <p:nvGrpSpPr>
@@ -18391,7 +18397,7 @@
 </file>
 
 <file path=ppt/slides/slide17.xml><?xml version="1.0" encoding="utf-8"?>
-<p:sld xmlns:a="http://schemas.openxmlformats.org/drawingml/2006/main" xmlns:r="http://schemas.openxmlformats.org/officeDocument/2006/relationships" xmlns:mc="http://schemas.openxmlformats.org/markup-compatibility/2006" xmlns:mv="urn:schemas-microsoft-com:mac:vml" xmlns:p="http://schemas.openxmlformats.org/presentationml/2006/main" xmlns:c="http://schemas.openxmlformats.org/drawingml/2006/chart" xmlns:dgm="http://schemas.openxmlformats.org/drawingml/2006/diagram" xmlns:o="urn:schemas-microsoft-com:office:office" xmlns:v="urn:schemas-microsoft-com:vml" xmlns:pvml="urn:schemas-microsoft-com:office:powerpoint" xmlns:com="http://schemas.openxmlformats.org/drawingml/2006/compatibility" xmlns:p14="http://schemas.microsoft.com/office/powerpoint/2010/main" xmlns:p15="http://schemas.microsoft.com/office/powerpoint/2012/main">
+<p:sld xmlns:a="http://schemas.openxmlformats.org/drawingml/2006/main" xmlns:r="http://schemas.openxmlformats.org/officeDocument/2006/relationships" xmlns:mc="http://schemas.openxmlformats.org/markup-compatibility/2006" xmlns:mv="urn:schemas-microsoft-com:mac:vml" xmlns:p="http://schemas.openxmlformats.org/presentationml/2006/main" xmlns:c="http://schemas.openxmlformats.org/drawingml/2006/chart" xmlns:dgm="http://schemas.openxmlformats.org/drawingml/2006/diagram" xmlns:o="urn:schemas-microsoft-com:office:office" xmlns:v="urn:schemas-microsoft-com:vml" xmlns:pvml="urn:schemas-microsoft-com:office:powerpoint" xmlns:com="http://schemas.openxmlformats.org/drawingml/2006/compatibility" xmlns:p14="http://schemas.microsoft.com/office/powerpoint/2010/main" xmlns:p15="http://schemas.microsoft.com/office/powerpoint/2012/main" xmlns:ahyp="http://schemas.microsoft.com/office/drawing/2018/hyperlinkcolor">
   <p:cSld>
     <p:spTree>
       <p:nvGrpSpPr>
@@ -18552,7 +18558,7 @@
 </file>
 
 <file path=ppt/slides/slide18.xml><?xml version="1.0" encoding="utf-8"?>
-<p:sld xmlns:a="http://schemas.openxmlformats.org/drawingml/2006/main" xmlns:r="http://schemas.openxmlformats.org/officeDocument/2006/relationships" xmlns:mc="http://schemas.openxmlformats.org/markup-compatibility/2006" xmlns:mv="urn:schemas-microsoft-com:mac:vml" xmlns:p="http://schemas.openxmlformats.org/presentationml/2006/main" xmlns:c="http://schemas.openxmlformats.org/drawingml/2006/chart" xmlns:dgm="http://schemas.openxmlformats.org/drawingml/2006/diagram" xmlns:o="urn:schemas-microsoft-com:office:office" xmlns:v="urn:schemas-microsoft-com:vml" xmlns:pvml="urn:schemas-microsoft-com:office:powerpoint" xmlns:com="http://schemas.openxmlformats.org/drawingml/2006/compatibility" xmlns:p14="http://schemas.microsoft.com/office/powerpoint/2010/main" xmlns:p15="http://schemas.microsoft.com/office/powerpoint/2012/main">
+<p:sld xmlns:a="http://schemas.openxmlformats.org/drawingml/2006/main" xmlns:r="http://schemas.openxmlformats.org/officeDocument/2006/relationships" xmlns:mc="http://schemas.openxmlformats.org/markup-compatibility/2006" xmlns:mv="urn:schemas-microsoft-com:mac:vml" xmlns:p="http://schemas.openxmlformats.org/presentationml/2006/main" xmlns:c="http://schemas.openxmlformats.org/drawingml/2006/chart" xmlns:dgm="http://schemas.openxmlformats.org/drawingml/2006/diagram" xmlns:o="urn:schemas-microsoft-com:office:office" xmlns:v="urn:schemas-microsoft-com:vml" xmlns:pvml="urn:schemas-microsoft-com:office:powerpoint" xmlns:com="http://schemas.openxmlformats.org/drawingml/2006/compatibility" xmlns:p14="http://schemas.microsoft.com/office/powerpoint/2010/main" xmlns:p15="http://schemas.microsoft.com/office/powerpoint/2012/main" xmlns:ahyp="http://schemas.microsoft.com/office/drawing/2018/hyperlinkcolor">
   <p:cSld>
     <p:spTree>
       <p:nvGrpSpPr>
@@ -18685,7 +18691,7 @@
 </file>
 
 <file path=ppt/slides/slide19.xml><?xml version="1.0" encoding="utf-8"?>
-<p:sld xmlns:a="http://schemas.openxmlformats.org/drawingml/2006/main" xmlns:r="http://schemas.openxmlformats.org/officeDocument/2006/relationships" xmlns:mc="http://schemas.openxmlformats.org/markup-compatibility/2006" xmlns:mv="urn:schemas-microsoft-com:mac:vml" xmlns:p="http://schemas.openxmlformats.org/presentationml/2006/main" xmlns:c="http://schemas.openxmlformats.org/drawingml/2006/chart" xmlns:dgm="http://schemas.openxmlformats.org/drawingml/2006/diagram" xmlns:o="urn:schemas-microsoft-com:office:office" xmlns:v="urn:schemas-microsoft-com:vml" xmlns:pvml="urn:schemas-microsoft-com:office:powerpoint" xmlns:com="http://schemas.openxmlformats.org/drawingml/2006/compatibility" xmlns:p14="http://schemas.microsoft.com/office/powerpoint/2010/main" xmlns:p15="http://schemas.microsoft.com/office/powerpoint/2012/main">
+<p:sld xmlns:a="http://schemas.openxmlformats.org/drawingml/2006/main" xmlns:r="http://schemas.openxmlformats.org/officeDocument/2006/relationships" xmlns:mc="http://schemas.openxmlformats.org/markup-compatibility/2006" xmlns:mv="urn:schemas-microsoft-com:mac:vml" xmlns:p="http://schemas.openxmlformats.org/presentationml/2006/main" xmlns:c="http://schemas.openxmlformats.org/drawingml/2006/chart" xmlns:dgm="http://schemas.openxmlformats.org/drawingml/2006/diagram" xmlns:o="urn:schemas-microsoft-com:office:office" xmlns:v="urn:schemas-microsoft-com:vml" xmlns:pvml="urn:schemas-microsoft-com:office:powerpoint" xmlns:com="http://schemas.openxmlformats.org/drawingml/2006/compatibility" xmlns:p14="http://schemas.microsoft.com/office/powerpoint/2010/main" xmlns:p15="http://schemas.microsoft.com/office/powerpoint/2012/main" xmlns:ahyp="http://schemas.microsoft.com/office/drawing/2018/hyperlinkcolor">
   <p:cSld>
     <p:spTree>
       <p:nvGrpSpPr>
@@ -19352,7 +19358,7 @@
 </file>
 
 <file path=ppt/slides/slide2.xml><?xml version="1.0" encoding="utf-8"?>
-<p:sld xmlns:a="http://schemas.openxmlformats.org/drawingml/2006/main" xmlns:r="http://schemas.openxmlformats.org/officeDocument/2006/relationships" xmlns:mc="http://schemas.openxmlformats.org/markup-compatibility/2006" xmlns:mv="urn:schemas-microsoft-com:mac:vml" xmlns:p="http://schemas.openxmlformats.org/presentationml/2006/main" xmlns:c="http://schemas.openxmlformats.org/drawingml/2006/chart" xmlns:dgm="http://schemas.openxmlformats.org/drawingml/2006/diagram" xmlns:o="urn:schemas-microsoft-com:office:office" xmlns:v="urn:schemas-microsoft-com:vml" xmlns:pvml="urn:schemas-microsoft-com:office:powerpoint" xmlns:com="http://schemas.openxmlformats.org/drawingml/2006/compatibility" xmlns:p14="http://schemas.microsoft.com/office/powerpoint/2010/main" xmlns:p15="http://schemas.microsoft.com/office/powerpoint/2012/main">
+<p:sld xmlns:a="http://schemas.openxmlformats.org/drawingml/2006/main" xmlns:r="http://schemas.openxmlformats.org/officeDocument/2006/relationships" xmlns:mc="http://schemas.openxmlformats.org/markup-compatibility/2006" xmlns:mv="urn:schemas-microsoft-com:mac:vml" xmlns:p="http://schemas.openxmlformats.org/presentationml/2006/main" xmlns:c="http://schemas.openxmlformats.org/drawingml/2006/chart" xmlns:dgm="http://schemas.openxmlformats.org/drawingml/2006/diagram" xmlns:o="urn:schemas-microsoft-com:office:office" xmlns:v="urn:schemas-microsoft-com:vml" xmlns:pvml="urn:schemas-microsoft-com:office:powerpoint" xmlns:com="http://schemas.openxmlformats.org/drawingml/2006/compatibility" xmlns:p14="http://schemas.microsoft.com/office/powerpoint/2010/main" xmlns:p15="http://schemas.microsoft.com/office/powerpoint/2012/main" xmlns:ahyp="http://schemas.microsoft.com/office/drawing/2018/hyperlinkcolor">
   <p:cSld>
     <p:spTree>
       <p:nvGrpSpPr>
@@ -19533,7 +19539,7 @@
 </file>
 
 <file path=ppt/slides/slide20.xml><?xml version="1.0" encoding="utf-8"?>
-<p:sld xmlns:a="http://schemas.openxmlformats.org/drawingml/2006/main" xmlns:r="http://schemas.openxmlformats.org/officeDocument/2006/relationships" xmlns:mc="http://schemas.openxmlformats.org/markup-compatibility/2006" xmlns:mv="urn:schemas-microsoft-com:mac:vml" xmlns:p="http://schemas.openxmlformats.org/presentationml/2006/main" xmlns:c="http://schemas.openxmlformats.org/drawingml/2006/chart" xmlns:dgm="http://schemas.openxmlformats.org/drawingml/2006/diagram" xmlns:o="urn:schemas-microsoft-com:office:office" xmlns:v="urn:schemas-microsoft-com:vml" xmlns:pvml="urn:schemas-microsoft-com:office:powerpoint" xmlns:com="http://schemas.openxmlformats.org/drawingml/2006/compatibility" xmlns:p14="http://schemas.microsoft.com/office/powerpoint/2010/main" xmlns:p15="http://schemas.microsoft.com/office/powerpoint/2012/main">
+<p:sld xmlns:a="http://schemas.openxmlformats.org/drawingml/2006/main" xmlns:r="http://schemas.openxmlformats.org/officeDocument/2006/relationships" xmlns:mc="http://schemas.openxmlformats.org/markup-compatibility/2006" xmlns:mv="urn:schemas-microsoft-com:mac:vml" xmlns:p="http://schemas.openxmlformats.org/presentationml/2006/main" xmlns:c="http://schemas.openxmlformats.org/drawingml/2006/chart" xmlns:dgm="http://schemas.openxmlformats.org/drawingml/2006/diagram" xmlns:o="urn:schemas-microsoft-com:office:office" xmlns:v="urn:schemas-microsoft-com:vml" xmlns:pvml="urn:schemas-microsoft-com:office:powerpoint" xmlns:com="http://schemas.openxmlformats.org/drawingml/2006/compatibility" xmlns:p14="http://schemas.microsoft.com/office/powerpoint/2010/main" xmlns:p15="http://schemas.microsoft.com/office/powerpoint/2012/main" xmlns:ahyp="http://schemas.microsoft.com/office/drawing/2018/hyperlinkcolor">
   <p:cSld>
     <p:spTree>
       <p:nvGrpSpPr>
@@ -19642,7 +19648,7 @@
 </file>
 
 <file path=ppt/slides/slide21.xml><?xml version="1.0" encoding="utf-8"?>
-<p:sld xmlns:a="http://schemas.openxmlformats.org/drawingml/2006/main" xmlns:r="http://schemas.openxmlformats.org/officeDocument/2006/relationships" xmlns:mc="http://schemas.openxmlformats.org/markup-compatibility/2006" xmlns:mv="urn:schemas-microsoft-com:mac:vml" xmlns:p="http://schemas.openxmlformats.org/presentationml/2006/main" xmlns:c="http://schemas.openxmlformats.org/drawingml/2006/chart" xmlns:dgm="http://schemas.openxmlformats.org/drawingml/2006/diagram" xmlns:o="urn:schemas-microsoft-com:office:office" xmlns:v="urn:schemas-microsoft-com:vml" xmlns:pvml="urn:schemas-microsoft-com:office:powerpoint" xmlns:com="http://schemas.openxmlformats.org/drawingml/2006/compatibility" xmlns:p14="http://schemas.microsoft.com/office/powerpoint/2010/main" xmlns:p15="http://schemas.microsoft.com/office/powerpoint/2012/main">
+<p:sld xmlns:a="http://schemas.openxmlformats.org/drawingml/2006/main" xmlns:r="http://schemas.openxmlformats.org/officeDocument/2006/relationships" xmlns:mc="http://schemas.openxmlformats.org/markup-compatibility/2006" xmlns:mv="urn:schemas-microsoft-com:mac:vml" xmlns:p="http://schemas.openxmlformats.org/presentationml/2006/main" xmlns:c="http://schemas.openxmlformats.org/drawingml/2006/chart" xmlns:dgm="http://schemas.openxmlformats.org/drawingml/2006/diagram" xmlns:o="urn:schemas-microsoft-com:office:office" xmlns:v="urn:schemas-microsoft-com:vml" xmlns:pvml="urn:schemas-microsoft-com:office:powerpoint" xmlns:com="http://schemas.openxmlformats.org/drawingml/2006/compatibility" xmlns:p14="http://schemas.microsoft.com/office/powerpoint/2010/main" xmlns:p15="http://schemas.microsoft.com/office/powerpoint/2012/main" xmlns:ahyp="http://schemas.microsoft.com/office/drawing/2018/hyperlinkcolor">
   <p:cSld>
     <p:spTree>
       <p:nvGrpSpPr>
@@ -19804,7 +19810,7 @@
 </file>
 
 <file path=ppt/slides/slide22.xml><?xml version="1.0" encoding="utf-8"?>
-<p:sld xmlns:a="http://schemas.openxmlformats.org/drawingml/2006/main" xmlns:r="http://schemas.openxmlformats.org/officeDocument/2006/relationships" xmlns:mc="http://schemas.openxmlformats.org/markup-compatibility/2006" xmlns:mv="urn:schemas-microsoft-com:mac:vml" xmlns:p="http://schemas.openxmlformats.org/presentationml/2006/main" xmlns:c="http://schemas.openxmlformats.org/drawingml/2006/chart" xmlns:dgm="http://schemas.openxmlformats.org/drawingml/2006/diagram" xmlns:o="urn:schemas-microsoft-com:office:office" xmlns:v="urn:schemas-microsoft-com:vml" xmlns:pvml="urn:schemas-microsoft-com:office:powerpoint" xmlns:com="http://schemas.openxmlformats.org/drawingml/2006/compatibility" xmlns:p14="http://schemas.microsoft.com/office/powerpoint/2010/main" xmlns:p15="http://schemas.microsoft.com/office/powerpoint/2012/main">
+<p:sld xmlns:a="http://schemas.openxmlformats.org/drawingml/2006/main" xmlns:r="http://schemas.openxmlformats.org/officeDocument/2006/relationships" xmlns:mc="http://schemas.openxmlformats.org/markup-compatibility/2006" xmlns:mv="urn:schemas-microsoft-com:mac:vml" xmlns:p="http://schemas.openxmlformats.org/presentationml/2006/main" xmlns:c="http://schemas.openxmlformats.org/drawingml/2006/chart" xmlns:dgm="http://schemas.openxmlformats.org/drawingml/2006/diagram" xmlns:o="urn:schemas-microsoft-com:office:office" xmlns:v="urn:schemas-microsoft-com:vml" xmlns:pvml="urn:schemas-microsoft-com:office:powerpoint" xmlns:com="http://schemas.openxmlformats.org/drawingml/2006/compatibility" xmlns:p14="http://schemas.microsoft.com/office/powerpoint/2010/main" xmlns:p15="http://schemas.microsoft.com/office/powerpoint/2012/main" xmlns:ahyp="http://schemas.microsoft.com/office/drawing/2018/hyperlinkcolor">
   <p:cSld>
     <p:spTree>
       <p:nvGrpSpPr>
@@ -20937,7 +20943,7 @@
 </file>
 
 <file path=ppt/slides/slide23.xml><?xml version="1.0" encoding="utf-8"?>
-<p:sld xmlns:a="http://schemas.openxmlformats.org/drawingml/2006/main" xmlns:r="http://schemas.openxmlformats.org/officeDocument/2006/relationships" xmlns:mc="http://schemas.openxmlformats.org/markup-compatibility/2006" xmlns:mv="urn:schemas-microsoft-com:mac:vml" xmlns:p="http://schemas.openxmlformats.org/presentationml/2006/main" xmlns:c="http://schemas.openxmlformats.org/drawingml/2006/chart" xmlns:dgm="http://schemas.openxmlformats.org/drawingml/2006/diagram" xmlns:o="urn:schemas-microsoft-com:office:office" xmlns:v="urn:schemas-microsoft-com:vml" xmlns:pvml="urn:schemas-microsoft-com:office:powerpoint" xmlns:com="http://schemas.openxmlformats.org/drawingml/2006/compatibility" xmlns:p14="http://schemas.microsoft.com/office/powerpoint/2010/main" xmlns:p15="http://schemas.microsoft.com/office/powerpoint/2012/main">
+<p:sld xmlns:a="http://schemas.openxmlformats.org/drawingml/2006/main" xmlns:r="http://schemas.openxmlformats.org/officeDocument/2006/relationships" xmlns:mc="http://schemas.openxmlformats.org/markup-compatibility/2006" xmlns:mv="urn:schemas-microsoft-com:mac:vml" xmlns:p="http://schemas.openxmlformats.org/presentationml/2006/main" xmlns:c="http://schemas.openxmlformats.org/drawingml/2006/chart" xmlns:dgm="http://schemas.openxmlformats.org/drawingml/2006/diagram" xmlns:o="urn:schemas-microsoft-com:office:office" xmlns:v="urn:schemas-microsoft-com:vml" xmlns:pvml="urn:schemas-microsoft-com:office:powerpoint" xmlns:com="http://schemas.openxmlformats.org/drawingml/2006/compatibility" xmlns:p14="http://schemas.microsoft.com/office/powerpoint/2010/main" xmlns:p15="http://schemas.microsoft.com/office/powerpoint/2012/main" xmlns:ahyp="http://schemas.microsoft.com/office/drawing/2018/hyperlinkcolor">
   <p:cSld>
     <p:spTree>
       <p:nvGrpSpPr>
@@ -21109,7 +21115,7 @@
 </file>
 
 <file path=ppt/slides/slide24.xml><?xml version="1.0" encoding="utf-8"?>
-<p:sld xmlns:a="http://schemas.openxmlformats.org/drawingml/2006/main" xmlns:r="http://schemas.openxmlformats.org/officeDocument/2006/relationships" xmlns:mc="http://schemas.openxmlformats.org/markup-compatibility/2006" xmlns:mv="urn:schemas-microsoft-com:mac:vml" xmlns:p="http://schemas.openxmlformats.org/presentationml/2006/main" xmlns:c="http://schemas.openxmlformats.org/drawingml/2006/chart" xmlns:dgm="http://schemas.openxmlformats.org/drawingml/2006/diagram" xmlns:o="urn:schemas-microsoft-com:office:office" xmlns:v="urn:schemas-microsoft-com:vml" xmlns:pvml="urn:schemas-microsoft-com:office:powerpoint" xmlns:com="http://schemas.openxmlformats.org/drawingml/2006/compatibility" xmlns:p14="http://schemas.microsoft.com/office/powerpoint/2010/main" xmlns:p15="http://schemas.microsoft.com/office/powerpoint/2012/main">
+<p:sld xmlns:a="http://schemas.openxmlformats.org/drawingml/2006/main" xmlns:r="http://schemas.openxmlformats.org/officeDocument/2006/relationships" xmlns:mc="http://schemas.openxmlformats.org/markup-compatibility/2006" xmlns:mv="urn:schemas-microsoft-com:mac:vml" xmlns:p="http://schemas.openxmlformats.org/presentationml/2006/main" xmlns:c="http://schemas.openxmlformats.org/drawingml/2006/chart" xmlns:dgm="http://schemas.openxmlformats.org/drawingml/2006/diagram" xmlns:o="urn:schemas-microsoft-com:office:office" xmlns:v="urn:schemas-microsoft-com:vml" xmlns:pvml="urn:schemas-microsoft-com:office:powerpoint" xmlns:com="http://schemas.openxmlformats.org/drawingml/2006/compatibility" xmlns:p14="http://schemas.microsoft.com/office/powerpoint/2010/main" xmlns:p15="http://schemas.microsoft.com/office/powerpoint/2012/main" xmlns:ahyp="http://schemas.microsoft.com/office/drawing/2018/hyperlinkcolor">
   <p:cSld>
     <p:spTree>
       <p:nvGrpSpPr>
@@ -21183,7 +21189,7 @@
 </file>
 
 <file path=ppt/slides/slide3.xml><?xml version="1.0" encoding="utf-8"?>
-<p:sld xmlns:a="http://schemas.openxmlformats.org/drawingml/2006/main" xmlns:r="http://schemas.openxmlformats.org/officeDocument/2006/relationships" xmlns:mc="http://schemas.openxmlformats.org/markup-compatibility/2006" xmlns:mv="urn:schemas-microsoft-com:mac:vml" xmlns:p="http://schemas.openxmlformats.org/presentationml/2006/main" xmlns:c="http://schemas.openxmlformats.org/drawingml/2006/chart" xmlns:dgm="http://schemas.openxmlformats.org/drawingml/2006/diagram" xmlns:o="urn:schemas-microsoft-com:office:office" xmlns:v="urn:schemas-microsoft-com:vml" xmlns:pvml="urn:schemas-microsoft-com:office:powerpoint" xmlns:com="http://schemas.openxmlformats.org/drawingml/2006/compatibility" xmlns:p14="http://schemas.microsoft.com/office/powerpoint/2010/main" xmlns:p15="http://schemas.microsoft.com/office/powerpoint/2012/main">
+<p:sld xmlns:a="http://schemas.openxmlformats.org/drawingml/2006/main" xmlns:r="http://schemas.openxmlformats.org/officeDocument/2006/relationships" xmlns:mc="http://schemas.openxmlformats.org/markup-compatibility/2006" xmlns:mv="urn:schemas-microsoft-com:mac:vml" xmlns:p="http://schemas.openxmlformats.org/presentationml/2006/main" xmlns:c="http://schemas.openxmlformats.org/drawingml/2006/chart" xmlns:dgm="http://schemas.openxmlformats.org/drawingml/2006/diagram" xmlns:o="urn:schemas-microsoft-com:office:office" xmlns:v="urn:schemas-microsoft-com:vml" xmlns:pvml="urn:schemas-microsoft-com:office:powerpoint" xmlns:com="http://schemas.openxmlformats.org/drawingml/2006/compatibility" xmlns:p14="http://schemas.microsoft.com/office/powerpoint/2010/main" xmlns:p15="http://schemas.microsoft.com/office/powerpoint/2012/main" xmlns:ahyp="http://schemas.microsoft.com/office/drawing/2018/hyperlinkcolor">
   <p:cSld>
     <p:spTree>
       <p:nvGrpSpPr>
@@ -21284,7 +21290,7 @@
 </file>
 
 <file path=ppt/slides/slide4.xml><?xml version="1.0" encoding="utf-8"?>
-<p:sld xmlns:a="http://schemas.openxmlformats.org/drawingml/2006/main" xmlns:r="http://schemas.openxmlformats.org/officeDocument/2006/relationships" xmlns:mc="http://schemas.openxmlformats.org/markup-compatibility/2006" xmlns:mv="urn:schemas-microsoft-com:mac:vml" xmlns:p="http://schemas.openxmlformats.org/presentationml/2006/main" xmlns:c="http://schemas.openxmlformats.org/drawingml/2006/chart" xmlns:dgm="http://schemas.openxmlformats.org/drawingml/2006/diagram" xmlns:o="urn:schemas-microsoft-com:office:office" xmlns:v="urn:schemas-microsoft-com:vml" xmlns:pvml="urn:schemas-microsoft-com:office:powerpoint" xmlns:com="http://schemas.openxmlformats.org/drawingml/2006/compatibility" xmlns:p14="http://schemas.microsoft.com/office/powerpoint/2010/main" xmlns:p15="http://schemas.microsoft.com/office/powerpoint/2012/main">
+<p:sld xmlns:a="http://schemas.openxmlformats.org/drawingml/2006/main" xmlns:r="http://schemas.openxmlformats.org/officeDocument/2006/relationships" xmlns:mc="http://schemas.openxmlformats.org/markup-compatibility/2006" xmlns:mv="urn:schemas-microsoft-com:mac:vml" xmlns:p="http://schemas.openxmlformats.org/presentationml/2006/main" xmlns:c="http://schemas.openxmlformats.org/drawingml/2006/chart" xmlns:dgm="http://schemas.openxmlformats.org/drawingml/2006/diagram" xmlns:o="urn:schemas-microsoft-com:office:office" xmlns:v="urn:schemas-microsoft-com:vml" xmlns:pvml="urn:schemas-microsoft-com:office:powerpoint" xmlns:com="http://schemas.openxmlformats.org/drawingml/2006/compatibility" xmlns:p14="http://schemas.microsoft.com/office/powerpoint/2010/main" xmlns:p15="http://schemas.microsoft.com/office/powerpoint/2012/main" xmlns:ahyp="http://schemas.microsoft.com/office/drawing/2018/hyperlinkcolor">
   <p:cSld>
     <p:spTree>
       <p:nvGrpSpPr>
@@ -21467,7 +21473,7 @@
 </file>
 
 <file path=ppt/slides/slide5.xml><?xml version="1.0" encoding="utf-8"?>
-<p:sld xmlns:a="http://schemas.openxmlformats.org/drawingml/2006/main" xmlns:r="http://schemas.openxmlformats.org/officeDocument/2006/relationships" xmlns:mc="http://schemas.openxmlformats.org/markup-compatibility/2006" xmlns:mv="urn:schemas-microsoft-com:mac:vml" xmlns:p="http://schemas.openxmlformats.org/presentationml/2006/main" xmlns:c="http://schemas.openxmlformats.org/drawingml/2006/chart" xmlns:dgm="http://schemas.openxmlformats.org/drawingml/2006/diagram" xmlns:o="urn:schemas-microsoft-com:office:office" xmlns:v="urn:schemas-microsoft-com:vml" xmlns:pvml="urn:schemas-microsoft-com:office:powerpoint" xmlns:com="http://schemas.openxmlformats.org/drawingml/2006/compatibility" xmlns:p14="http://schemas.microsoft.com/office/powerpoint/2010/main" xmlns:p15="http://schemas.microsoft.com/office/powerpoint/2012/main">
+<p:sld xmlns:a="http://schemas.openxmlformats.org/drawingml/2006/main" xmlns:r="http://schemas.openxmlformats.org/officeDocument/2006/relationships" xmlns:mc="http://schemas.openxmlformats.org/markup-compatibility/2006" xmlns:mv="urn:schemas-microsoft-com:mac:vml" xmlns:p="http://schemas.openxmlformats.org/presentationml/2006/main" xmlns:c="http://schemas.openxmlformats.org/drawingml/2006/chart" xmlns:dgm="http://schemas.openxmlformats.org/drawingml/2006/diagram" xmlns:o="urn:schemas-microsoft-com:office:office" xmlns:v="urn:schemas-microsoft-com:vml" xmlns:pvml="urn:schemas-microsoft-com:office:powerpoint" xmlns:com="http://schemas.openxmlformats.org/drawingml/2006/compatibility" xmlns:p14="http://schemas.microsoft.com/office/powerpoint/2010/main" xmlns:p15="http://schemas.microsoft.com/office/powerpoint/2012/main" xmlns:ahyp="http://schemas.microsoft.com/office/drawing/2018/hyperlinkcolor">
   <p:cSld>
     <p:spTree>
       <p:nvGrpSpPr>
@@ -21803,7 +21809,7 @@
 </file>
 
 <file path=ppt/slides/slide6.xml><?xml version="1.0" encoding="utf-8"?>
-<p:sld xmlns:a="http://schemas.openxmlformats.org/drawingml/2006/main" xmlns:r="http://schemas.openxmlformats.org/officeDocument/2006/relationships" xmlns:mc="http://schemas.openxmlformats.org/markup-compatibility/2006" xmlns:mv="urn:schemas-microsoft-com:mac:vml" xmlns:p="http://schemas.openxmlformats.org/presentationml/2006/main" xmlns:c="http://schemas.openxmlformats.org/drawingml/2006/chart" xmlns:dgm="http://schemas.openxmlformats.org/drawingml/2006/diagram" xmlns:o="urn:schemas-microsoft-com:office:office" xmlns:v="urn:schemas-microsoft-com:vml" xmlns:pvml="urn:schemas-microsoft-com:office:powerpoint" xmlns:com="http://schemas.openxmlformats.org/drawingml/2006/compatibility" xmlns:p14="http://schemas.microsoft.com/office/powerpoint/2010/main" xmlns:p15="http://schemas.microsoft.com/office/powerpoint/2012/main">
+<p:sld xmlns:a="http://schemas.openxmlformats.org/drawingml/2006/main" xmlns:r="http://schemas.openxmlformats.org/officeDocument/2006/relationships" xmlns:mc="http://schemas.openxmlformats.org/markup-compatibility/2006" xmlns:mv="urn:schemas-microsoft-com:mac:vml" xmlns:p="http://schemas.openxmlformats.org/presentationml/2006/main" xmlns:c="http://schemas.openxmlformats.org/drawingml/2006/chart" xmlns:dgm="http://schemas.openxmlformats.org/drawingml/2006/diagram" xmlns:o="urn:schemas-microsoft-com:office:office" xmlns:v="urn:schemas-microsoft-com:vml" xmlns:pvml="urn:schemas-microsoft-com:office:powerpoint" xmlns:com="http://schemas.openxmlformats.org/drawingml/2006/compatibility" xmlns:p14="http://schemas.microsoft.com/office/powerpoint/2010/main" xmlns:p15="http://schemas.microsoft.com/office/powerpoint/2012/main" xmlns:ahyp="http://schemas.microsoft.com/office/drawing/2018/hyperlinkcolor">
   <p:cSld>
     <p:spTree>
       <p:nvGrpSpPr>
@@ -22186,7 +22192,7 @@
 </file>
 
 <file path=ppt/slides/slide7.xml><?xml version="1.0" encoding="utf-8"?>
-<p:sld xmlns:a="http://schemas.openxmlformats.org/drawingml/2006/main" xmlns:r="http://schemas.openxmlformats.org/officeDocument/2006/relationships" xmlns:mc="http://schemas.openxmlformats.org/markup-compatibility/2006" xmlns:mv="urn:schemas-microsoft-com:mac:vml" xmlns:p="http://schemas.openxmlformats.org/presentationml/2006/main" xmlns:c="http://schemas.openxmlformats.org/drawingml/2006/chart" xmlns:dgm="http://schemas.openxmlformats.org/drawingml/2006/diagram" xmlns:o="urn:schemas-microsoft-com:office:office" xmlns:v="urn:schemas-microsoft-com:vml" xmlns:pvml="urn:schemas-microsoft-com:office:powerpoint" xmlns:com="http://schemas.openxmlformats.org/drawingml/2006/compatibility" xmlns:p14="http://schemas.microsoft.com/office/powerpoint/2010/main" xmlns:p15="http://schemas.microsoft.com/office/powerpoint/2012/main">
+<p:sld xmlns:a="http://schemas.openxmlformats.org/drawingml/2006/main" xmlns:r="http://schemas.openxmlformats.org/officeDocument/2006/relationships" xmlns:mc="http://schemas.openxmlformats.org/markup-compatibility/2006" xmlns:mv="urn:schemas-microsoft-com:mac:vml" xmlns:p="http://schemas.openxmlformats.org/presentationml/2006/main" xmlns:c="http://schemas.openxmlformats.org/drawingml/2006/chart" xmlns:dgm="http://schemas.openxmlformats.org/drawingml/2006/diagram" xmlns:o="urn:schemas-microsoft-com:office:office" xmlns:v="urn:schemas-microsoft-com:vml" xmlns:pvml="urn:schemas-microsoft-com:office:powerpoint" xmlns:com="http://schemas.openxmlformats.org/drawingml/2006/compatibility" xmlns:p14="http://schemas.microsoft.com/office/powerpoint/2010/main" xmlns:p15="http://schemas.microsoft.com/office/powerpoint/2012/main" xmlns:ahyp="http://schemas.microsoft.com/office/drawing/2018/hyperlinkcolor">
   <p:cSld>
     <p:spTree>
       <p:nvGrpSpPr>
@@ -22696,7 +22702,7 @@
 </file>
 
 <file path=ppt/slides/slide8.xml><?xml version="1.0" encoding="utf-8"?>
-<p:sld xmlns:a="http://schemas.openxmlformats.org/drawingml/2006/main" xmlns:r="http://schemas.openxmlformats.org/officeDocument/2006/relationships" xmlns:mc="http://schemas.openxmlformats.org/markup-compatibility/2006" xmlns:mv="urn:schemas-microsoft-com:mac:vml" xmlns:p="http://schemas.openxmlformats.org/presentationml/2006/main" xmlns:c="http://schemas.openxmlformats.org/drawingml/2006/chart" xmlns:dgm="http://schemas.openxmlformats.org/drawingml/2006/diagram" xmlns:o="urn:schemas-microsoft-com:office:office" xmlns:v="urn:schemas-microsoft-com:vml" xmlns:pvml="urn:schemas-microsoft-com:office:powerpoint" xmlns:com="http://schemas.openxmlformats.org/drawingml/2006/compatibility" xmlns:p14="http://schemas.microsoft.com/office/powerpoint/2010/main" xmlns:p15="http://schemas.microsoft.com/office/powerpoint/2012/main">
+<p:sld xmlns:a="http://schemas.openxmlformats.org/drawingml/2006/main" xmlns:r="http://schemas.openxmlformats.org/officeDocument/2006/relationships" xmlns:mc="http://schemas.openxmlformats.org/markup-compatibility/2006" xmlns:mv="urn:schemas-microsoft-com:mac:vml" xmlns:p="http://schemas.openxmlformats.org/presentationml/2006/main" xmlns:c="http://schemas.openxmlformats.org/drawingml/2006/chart" xmlns:dgm="http://schemas.openxmlformats.org/drawingml/2006/diagram" xmlns:o="urn:schemas-microsoft-com:office:office" xmlns:v="urn:schemas-microsoft-com:vml" xmlns:pvml="urn:schemas-microsoft-com:office:powerpoint" xmlns:com="http://schemas.openxmlformats.org/drawingml/2006/compatibility" xmlns:p14="http://schemas.microsoft.com/office/powerpoint/2010/main" xmlns:p15="http://schemas.microsoft.com/office/powerpoint/2012/main" xmlns:ahyp="http://schemas.microsoft.com/office/drawing/2018/hyperlinkcolor">
   <p:cSld>
     <p:spTree>
       <p:nvGrpSpPr>
@@ -22878,7 +22884,7 @@
 </file>
 
 <file path=ppt/slides/slide9.xml><?xml version="1.0" encoding="utf-8"?>
-<p:sld xmlns:a="http://schemas.openxmlformats.org/drawingml/2006/main" xmlns:r="http://schemas.openxmlformats.org/officeDocument/2006/relationships" xmlns:mc="http://schemas.openxmlformats.org/markup-compatibility/2006" xmlns:mv="urn:schemas-microsoft-com:mac:vml" xmlns:p="http://schemas.openxmlformats.org/presentationml/2006/main" xmlns:c="http://schemas.openxmlformats.org/drawingml/2006/chart" xmlns:dgm="http://schemas.openxmlformats.org/drawingml/2006/diagram" xmlns:o="urn:schemas-microsoft-com:office:office" xmlns:v="urn:schemas-microsoft-com:vml" xmlns:pvml="urn:schemas-microsoft-com:office:powerpoint" xmlns:com="http://schemas.openxmlformats.org/drawingml/2006/compatibility" xmlns:p14="http://schemas.microsoft.com/office/powerpoint/2010/main" xmlns:p15="http://schemas.microsoft.com/office/powerpoint/2012/main">
+<p:sld xmlns:a="http://schemas.openxmlformats.org/drawingml/2006/main" xmlns:r="http://schemas.openxmlformats.org/officeDocument/2006/relationships" xmlns:mc="http://schemas.openxmlformats.org/markup-compatibility/2006" xmlns:mv="urn:schemas-microsoft-com:mac:vml" xmlns:p="http://schemas.openxmlformats.org/presentationml/2006/main" xmlns:c="http://schemas.openxmlformats.org/drawingml/2006/chart" xmlns:dgm="http://schemas.openxmlformats.org/drawingml/2006/diagram" xmlns:o="urn:schemas-microsoft-com:office:office" xmlns:v="urn:schemas-microsoft-com:vml" xmlns:pvml="urn:schemas-microsoft-com:office:powerpoint" xmlns:com="http://schemas.openxmlformats.org/drawingml/2006/compatibility" xmlns:p14="http://schemas.microsoft.com/office/powerpoint/2010/main" xmlns:p15="http://schemas.microsoft.com/office/powerpoint/2012/main" xmlns:ahyp="http://schemas.microsoft.com/office/drawing/2018/hyperlinkcolor">
   <p:cSld>
     <p:spTree>
       <p:nvGrpSpPr>

</xml_diff>